<commit_message>
Added transitions to presentation
</commit_message>
<xml_diff>
--- a/Docs/seminar/presentation.pptx
+++ b/Docs/seminar/presentation.pptx
@@ -5,7 +5,7 @@
     <p:sldMasterId id="2147483648" r:id="rId1"/>
   </p:sldMasterIdLst>
   <p:notesMasterIdLst>
-    <p:notesMasterId r:id="rId26"/>
+    <p:notesMasterId r:id="rId27"/>
   </p:notesMasterIdLst>
   <p:sldIdLst>
     <p:sldId id="256" r:id="rId2"/>
@@ -15,23 +15,24 @@
     <p:sldId id="260" r:id="rId6"/>
     <p:sldId id="261" r:id="rId7"/>
     <p:sldId id="262" r:id="rId8"/>
-    <p:sldId id="264" r:id="rId9"/>
-    <p:sldId id="263" r:id="rId10"/>
-    <p:sldId id="265" r:id="rId11"/>
-    <p:sldId id="266" r:id="rId12"/>
-    <p:sldId id="267" r:id="rId13"/>
-    <p:sldId id="268" r:id="rId14"/>
-    <p:sldId id="269" r:id="rId15"/>
-    <p:sldId id="270" r:id="rId16"/>
-    <p:sldId id="271" r:id="rId17"/>
-    <p:sldId id="272" r:id="rId18"/>
-    <p:sldId id="273" r:id="rId19"/>
-    <p:sldId id="274" r:id="rId20"/>
-    <p:sldId id="275" r:id="rId21"/>
-    <p:sldId id="276" r:id="rId22"/>
-    <p:sldId id="277" r:id="rId23"/>
-    <p:sldId id="278" r:id="rId24"/>
-    <p:sldId id="279" r:id="rId25"/>
+    <p:sldId id="280" r:id="rId9"/>
+    <p:sldId id="264" r:id="rId10"/>
+    <p:sldId id="263" r:id="rId11"/>
+    <p:sldId id="265" r:id="rId12"/>
+    <p:sldId id="266" r:id="rId13"/>
+    <p:sldId id="267" r:id="rId14"/>
+    <p:sldId id="268" r:id="rId15"/>
+    <p:sldId id="269" r:id="rId16"/>
+    <p:sldId id="270" r:id="rId17"/>
+    <p:sldId id="271" r:id="rId18"/>
+    <p:sldId id="272" r:id="rId19"/>
+    <p:sldId id="273" r:id="rId20"/>
+    <p:sldId id="274" r:id="rId21"/>
+    <p:sldId id="275" r:id="rId22"/>
+    <p:sldId id="276" r:id="rId23"/>
+    <p:sldId id="277" r:id="rId24"/>
+    <p:sldId id="278" r:id="rId25"/>
+    <p:sldId id="279" r:id="rId26"/>
   </p:sldIdLst>
   <p:sldSz cx="12192000" cy="6858000"/>
   <p:notesSz cx="6858000" cy="9144000"/>
@@ -144,6 +145,9 @@
           </p15:clr>
         </p15:guide>
       </p15:sldGuideLst>
+    </p:ext>
+    <p:ext uri="{2D200454-40CA-4A62-9FC3-DE9A4176ACB9}">
+      <p15:notesGuideLst xmlns:p15="http://schemas.microsoft.com/office/powerpoint/2012/main"/>
     </p:ext>
   </p:extLst>
 </p:presentation>
@@ -2653,6 +2657,13 @@
         </dgm:presLayoutVars>
       </dgm:prSet>
       <dgm:spPr/>
+      <dgm:t>
+        <a:bodyPr/>
+        <a:lstStyle/>
+        <a:p>
+          <a:endParaRPr lang="en-GB"/>
+        </a:p>
+      </dgm:t>
     </dgm:pt>
     <dgm:pt modelId="{A21DF865-76BF-4F04-8EE0-A187B966594E}" type="pres">
       <dgm:prSet presAssocID="{E868B88B-6FFA-4D7B-83F0-4636057982E0}" presName="ellipse" presStyleLbl="trBgShp" presStyleIdx="0" presStyleCnt="1"/>
@@ -2728,16 +2739,16 @@
     </dgm:pt>
   </dgm:ptLst>
   <dgm:cxnLst>
-    <dgm:cxn modelId="{693F637D-680B-46C9-8DAC-86A70E5AD68A}" type="presOf" srcId="{93EBB493-B93F-419C-A06C-E5A47E07EA8D}" destId="{CDFCF7F7-32F4-41AB-9C04-E78D350FCCB5}" srcOrd="0" destOrd="0" presId="urn:microsoft.com/office/officeart/2005/8/layout/funnel1"/>
+    <dgm:cxn modelId="{8A172B31-B1AF-4816-84BB-1124A05BDAF0}" srcId="{E868B88B-6FFA-4D7B-83F0-4636057982E0}" destId="{93EBB493-B93F-419C-A06C-E5A47E07EA8D}" srcOrd="3" destOrd="0" parTransId="{55BEF080-2430-47F1-8061-DA8876C270B9}" sibTransId="{6AA2E24A-65D8-4537-820A-6EF30ACD67F8}"/>
+    <dgm:cxn modelId="{2A70406F-9BDF-42B6-BFF2-262734758881}" type="presOf" srcId="{1F4A511F-B725-45D5-9B09-8F2C9CB5149E}" destId="{2F0F40B9-85F5-41A3-A7E7-C77C4DA30409}" srcOrd="0" destOrd="0" presId="urn:microsoft.com/office/officeart/2005/8/layout/funnel1"/>
     <dgm:cxn modelId="{660000AE-D144-461E-A625-0B5564B0796A}" srcId="{E868B88B-6FFA-4D7B-83F0-4636057982E0}" destId="{10094533-51E3-4C7B-B8F9-E52E8AB9BD19}" srcOrd="4" destOrd="0" parTransId="{A7521F0D-1EC8-4630-A073-B45C24D6F1CE}" sibTransId="{3F547DDD-F8D0-4CE3-BB92-79C5A7CFD150}"/>
-    <dgm:cxn modelId="{2A70406F-9BDF-42B6-BFF2-262734758881}" type="presOf" srcId="{1F4A511F-B725-45D5-9B09-8F2C9CB5149E}" destId="{2F0F40B9-85F5-41A3-A7E7-C77C4DA30409}" srcOrd="0" destOrd="0" presId="urn:microsoft.com/office/officeart/2005/8/layout/funnel1"/>
-    <dgm:cxn modelId="{1C79F1DF-5937-4F69-906D-8A688ED03DA4}" type="presOf" srcId="{A18C4404-9FEB-4C81-9F47-496D10139E5B}" destId="{1D05741E-6FB1-4030-8553-1AABA864752D}" srcOrd="0" destOrd="0" presId="urn:microsoft.com/office/officeart/2005/8/layout/funnel1"/>
-    <dgm:cxn modelId="{04395943-2F0F-4B15-A336-3E83F0952A35}" srcId="{E868B88B-6FFA-4D7B-83F0-4636057982E0}" destId="{CF2DAEC2-AF98-4B6E-874E-0B21F5C22699}" srcOrd="2" destOrd="0" parTransId="{6E5E8500-EC2A-4EC2-AE54-CD67CBED7C08}" sibTransId="{F9FF6F5D-47AB-4067-8671-130654AA611F}"/>
     <dgm:cxn modelId="{05031541-B17D-4D6B-BFA6-DA7D8EC68A78}" type="presOf" srcId="{E868B88B-6FFA-4D7B-83F0-4636057982E0}" destId="{EFBB94F3-0C85-41FA-95F7-0374BFF706C3}" srcOrd="0" destOrd="0" presId="urn:microsoft.com/office/officeart/2005/8/layout/funnel1"/>
-    <dgm:cxn modelId="{8A172B31-B1AF-4816-84BB-1124A05BDAF0}" srcId="{E868B88B-6FFA-4D7B-83F0-4636057982E0}" destId="{93EBB493-B93F-419C-A06C-E5A47E07EA8D}" srcOrd="3" destOrd="0" parTransId="{55BEF080-2430-47F1-8061-DA8876C270B9}" sibTransId="{6AA2E24A-65D8-4537-820A-6EF30ACD67F8}"/>
-    <dgm:cxn modelId="{B538F452-64F5-491A-A67F-8946E2C2C8D9}" srcId="{E868B88B-6FFA-4D7B-83F0-4636057982E0}" destId="{A18C4404-9FEB-4C81-9F47-496D10139E5B}" srcOrd="0" destOrd="0" parTransId="{9E68C65A-1616-4362-86C1-47ADE6B426A0}" sibTransId="{E03CFB90-32F4-4289-8160-5E6535485C43}"/>
     <dgm:cxn modelId="{9A6C8818-B2A1-491D-93FD-9B5CED27D71D}" type="presOf" srcId="{CF2DAEC2-AF98-4B6E-874E-0B21F5C22699}" destId="{038A45C9-5086-4E54-B58D-8739255E5C09}" srcOrd="0" destOrd="0" presId="urn:microsoft.com/office/officeart/2005/8/layout/funnel1"/>
     <dgm:cxn modelId="{C82D080A-B695-42BB-9689-3909715DC7FE}" srcId="{E868B88B-6FFA-4D7B-83F0-4636057982E0}" destId="{1F4A511F-B725-45D5-9B09-8F2C9CB5149E}" srcOrd="1" destOrd="0" parTransId="{338B85FC-CFFB-4D42-A8C1-C999810B518C}" sibTransId="{990EE446-A810-45B4-88DB-7D89DF19C639}"/>
+    <dgm:cxn modelId="{1C79F1DF-5937-4F69-906D-8A688ED03DA4}" type="presOf" srcId="{A18C4404-9FEB-4C81-9F47-496D10139E5B}" destId="{1D05741E-6FB1-4030-8553-1AABA864752D}" srcOrd="0" destOrd="0" presId="urn:microsoft.com/office/officeart/2005/8/layout/funnel1"/>
+    <dgm:cxn modelId="{B538F452-64F5-491A-A67F-8946E2C2C8D9}" srcId="{E868B88B-6FFA-4D7B-83F0-4636057982E0}" destId="{A18C4404-9FEB-4C81-9F47-496D10139E5B}" srcOrd="0" destOrd="0" parTransId="{9E68C65A-1616-4362-86C1-47ADE6B426A0}" sibTransId="{E03CFB90-32F4-4289-8160-5E6535485C43}"/>
+    <dgm:cxn modelId="{04395943-2F0F-4B15-A336-3E83F0952A35}" srcId="{E868B88B-6FFA-4D7B-83F0-4636057982E0}" destId="{CF2DAEC2-AF98-4B6E-874E-0B21F5C22699}" srcOrd="2" destOrd="0" parTransId="{6E5E8500-EC2A-4EC2-AE54-CD67CBED7C08}" sibTransId="{F9FF6F5D-47AB-4067-8671-130654AA611F}"/>
+    <dgm:cxn modelId="{693F637D-680B-46C9-8DAC-86A70E5AD68A}" type="presOf" srcId="{93EBB493-B93F-419C-A06C-E5A47E07EA8D}" destId="{CDFCF7F7-32F4-41AB-9C04-E78D350FCCB5}" srcOrd="0" destOrd="0" presId="urn:microsoft.com/office/officeart/2005/8/layout/funnel1"/>
     <dgm:cxn modelId="{D9B0298B-DC7F-4CE2-A2AB-577DEB52AF86}" type="presParOf" srcId="{EFBB94F3-0C85-41FA-95F7-0374BFF706C3}" destId="{A21DF865-76BF-4F04-8EE0-A187B966594E}" srcOrd="0" destOrd="0" presId="urn:microsoft.com/office/officeart/2005/8/layout/funnel1"/>
     <dgm:cxn modelId="{5CAF2812-838A-480E-8D5D-F6D7F6561C61}" type="presParOf" srcId="{EFBB94F3-0C85-41FA-95F7-0374BFF706C3}" destId="{A5EC8FE3-4DF9-4E21-999E-DFCB233E42DA}" srcOrd="1" destOrd="0" presId="urn:microsoft.com/office/officeart/2005/8/layout/funnel1"/>
     <dgm:cxn modelId="{830FA4F7-CBC2-4046-BB98-4B3ED6608F4E}" type="presParOf" srcId="{EFBB94F3-0C85-41FA-95F7-0374BFF706C3}" destId="{CDFCF7F7-32F4-41AB-9C04-E78D350FCCB5}" srcOrd="2" destOrd="0" presId="urn:microsoft.com/office/officeart/2005/8/layout/funnel1"/>
@@ -3038,6 +3049,13 @@
         </dgm:presLayoutVars>
       </dgm:prSet>
       <dgm:spPr/>
+      <dgm:t>
+        <a:bodyPr/>
+        <a:lstStyle/>
+        <a:p>
+          <a:endParaRPr lang="en-GB"/>
+        </a:p>
+      </dgm:t>
     </dgm:pt>
     <dgm:pt modelId="{17F7666B-F440-4E6C-BAC8-DBED384A533C}" type="pres">
       <dgm:prSet presAssocID="{A90E3BAF-857D-4B81-92B1-5BAB3238E52E}" presName="tSp" presStyleCnt="0"/>
@@ -3097,6 +3115,13 @@
         </dgm:presLayoutVars>
       </dgm:prSet>
       <dgm:spPr/>
+      <dgm:t>
+        <a:bodyPr/>
+        <a:lstStyle/>
+        <a:p>
+          <a:endParaRPr lang="en-GB"/>
+        </a:p>
+      </dgm:t>
     </dgm:pt>
     <dgm:pt modelId="{E0A2D85F-BBC9-4573-B685-2CF769F83CA1}" type="pres">
       <dgm:prSet presAssocID="{32CA4D76-14D8-4192-9A09-33DB59083F97}" presName="connSite1" presStyleCnt="0"/>
@@ -3105,6 +3130,13 @@
     <dgm:pt modelId="{2386F077-50CF-4EDD-BD4D-9032B62F1C8F}" type="pres">
       <dgm:prSet presAssocID="{45559F0F-76D7-4612-B5A4-2FB9ADE5042E}" presName="Name9" presStyleLbl="sibTrans2D1" presStyleIdx="0" presStyleCnt="2"/>
       <dgm:spPr/>
+      <dgm:t>
+        <a:bodyPr/>
+        <a:lstStyle/>
+        <a:p>
+          <a:endParaRPr lang="en-GB"/>
+        </a:p>
+      </dgm:t>
     </dgm:pt>
     <dgm:pt modelId="{B57F5C9D-35E5-4763-8698-7A083873E1E9}" type="pres">
       <dgm:prSet presAssocID="{8010C29B-2B30-46F9-BA16-D8F7C3E4E080}" presName="composite2" presStyleCnt="0"/>
@@ -3152,6 +3184,13 @@
         </dgm:presLayoutVars>
       </dgm:prSet>
       <dgm:spPr/>
+      <dgm:t>
+        <a:bodyPr/>
+        <a:lstStyle/>
+        <a:p>
+          <a:endParaRPr lang="en-GB"/>
+        </a:p>
+      </dgm:t>
     </dgm:pt>
     <dgm:pt modelId="{DBC95496-D0B6-45BD-A7AA-C0D6C4C7C5CA}" type="pres">
       <dgm:prSet presAssocID="{8010C29B-2B30-46F9-BA16-D8F7C3E4E080}" presName="connSite2" presStyleCnt="0"/>
@@ -3160,6 +3199,13 @@
     <dgm:pt modelId="{A4FB0482-F0ED-46E6-996E-80CC4EE28852}" type="pres">
       <dgm:prSet presAssocID="{4A5AC81D-889E-4A5D-91CC-054159E1EDBD}" presName="Name18" presStyleLbl="sibTrans2D1" presStyleIdx="1" presStyleCnt="2"/>
       <dgm:spPr/>
+      <dgm:t>
+        <a:bodyPr/>
+        <a:lstStyle/>
+        <a:p>
+          <a:endParaRPr lang="en-GB"/>
+        </a:p>
+      </dgm:t>
     </dgm:pt>
     <dgm:pt modelId="{F1834CC0-1BB5-437C-98A5-67377655DCD1}" type="pres">
       <dgm:prSet presAssocID="{C27831E2-64FF-4A27-9EE3-529C4B2FEAB3}" presName="composite1" presStyleCnt="0"/>
@@ -3221,27 +3267,27 @@
     </dgm:pt>
   </dgm:ptLst>
   <dgm:cxnLst>
+    <dgm:cxn modelId="{FD985CE2-8DF1-4833-9A57-31452F2BFBA3}" type="presOf" srcId="{C27831E2-64FF-4A27-9EE3-529C4B2FEAB3}" destId="{D8D16547-77BA-44E5-B855-3EA684E0178F}" srcOrd="0" destOrd="0" presId="urn:microsoft.com/office/officeart/2005/8/layout/hProcess4"/>
+    <dgm:cxn modelId="{D8D8FF00-A588-45DE-ADFA-2A92C5E94649}" type="presOf" srcId="{E0AEA09B-6124-4017-A4FA-89B2821F2134}" destId="{8C179D1E-B983-4B39-B4F3-E320103C0EF0}" srcOrd="0" destOrd="0" presId="urn:microsoft.com/office/officeart/2005/8/layout/hProcess4"/>
+    <dgm:cxn modelId="{8C8DE138-F128-4699-BD74-F88AA046A158}" type="presOf" srcId="{32CA4D76-14D8-4192-9A09-33DB59083F97}" destId="{2F0F5878-9767-4725-AC93-30AE560420E6}" srcOrd="0" destOrd="0" presId="urn:microsoft.com/office/officeart/2005/8/layout/hProcess4"/>
+    <dgm:cxn modelId="{627BFB97-37AC-460F-909F-7B162C4435DB}" srcId="{32CA4D76-14D8-4192-9A09-33DB59083F97}" destId="{4A3898C0-A95E-494E-94C1-76A57A5BCF9F}" srcOrd="0" destOrd="0" parTransId="{98BADDED-3554-4D76-BC17-0FFB90747C3E}" sibTransId="{8380947C-4540-4283-B124-B1F3C8FF777D}"/>
+    <dgm:cxn modelId="{5BCC97D7-C83B-44FA-894B-6830BA707488}" type="presOf" srcId="{4A5AC81D-889E-4A5D-91CC-054159E1EDBD}" destId="{A4FB0482-F0ED-46E6-996E-80CC4EE28852}" srcOrd="0" destOrd="0" presId="urn:microsoft.com/office/officeart/2005/8/layout/hProcess4"/>
+    <dgm:cxn modelId="{2FAB9263-57E9-49FF-952E-645CD38E25F8}" type="presOf" srcId="{4A3898C0-A95E-494E-94C1-76A57A5BCF9F}" destId="{54F7EA9F-2E08-4CD4-976E-2A0144297398}" srcOrd="1" destOrd="0" presId="urn:microsoft.com/office/officeart/2005/8/layout/hProcess4"/>
+    <dgm:cxn modelId="{0044E2C0-FB31-4986-A3D6-A61FB903459D}" type="presOf" srcId="{8010C29B-2B30-46F9-BA16-D8F7C3E4E080}" destId="{8EB404DE-7F61-4874-B161-31D7C2A524CA}" srcOrd="0" destOrd="0" presId="urn:microsoft.com/office/officeart/2005/8/layout/hProcess4"/>
+    <dgm:cxn modelId="{A5767D4E-9264-42EB-BFC7-7768F252C0CA}" type="presOf" srcId="{3866131A-3D92-4B08-910D-111E41851DA7}" destId="{298C4B9C-04DF-4B94-8FB4-7F300C0FC7BA}" srcOrd="1" destOrd="1" presId="urn:microsoft.com/office/officeart/2005/8/layout/hProcess4"/>
+    <dgm:cxn modelId="{7459170A-DA57-4B0A-A7AA-2F1816AEDF3D}" type="presOf" srcId="{610A53F2-A3C9-409D-9390-FD75E79349CF}" destId="{F9B84B71-D04E-466D-9A44-C37C0F6F9DBE}" srcOrd="1" destOrd="0" presId="urn:microsoft.com/office/officeart/2005/8/layout/hProcess4"/>
+    <dgm:cxn modelId="{81E4387C-152E-478E-B941-78363690FFC3}" srcId="{8010C29B-2B30-46F9-BA16-D8F7C3E4E080}" destId="{610A53F2-A3C9-409D-9390-FD75E79349CF}" srcOrd="0" destOrd="0" parTransId="{72E9AB30-5D5C-4963-B473-2ED716477B3C}" sibTransId="{2755FA1F-FE51-4E21-BB40-1EDF7CBDBBCA}"/>
+    <dgm:cxn modelId="{CBDF25D7-2B88-4B3C-BCB7-0B170A0667BB}" type="presOf" srcId="{610A53F2-A3C9-409D-9390-FD75E79349CF}" destId="{DE740FC7-95C6-4631-98E6-40B946E4011A}" srcOrd="0" destOrd="0" presId="urn:microsoft.com/office/officeart/2005/8/layout/hProcess4"/>
+    <dgm:cxn modelId="{F9516AC0-BB3A-43AF-A213-4EAD47EE93E8}" type="presOf" srcId="{3866131A-3D92-4B08-910D-111E41851DA7}" destId="{8C179D1E-B983-4B39-B4F3-E320103C0EF0}" srcOrd="0" destOrd="1" presId="urn:microsoft.com/office/officeart/2005/8/layout/hProcess4"/>
+    <dgm:cxn modelId="{EB14D925-A931-4F62-B1DC-CE2F23F1310C}" type="presOf" srcId="{45559F0F-76D7-4612-B5A4-2FB9ADE5042E}" destId="{2386F077-50CF-4EDD-BD4D-9032B62F1C8F}" srcOrd="0" destOrd="0" presId="urn:microsoft.com/office/officeart/2005/8/layout/hProcess4"/>
+    <dgm:cxn modelId="{01DD0AB7-9FE1-43CD-96E4-C6BB33B4C2F6}" type="presOf" srcId="{E0AEA09B-6124-4017-A4FA-89B2821F2134}" destId="{298C4B9C-04DF-4B94-8FB4-7F300C0FC7BA}" srcOrd="1" destOrd="0" presId="urn:microsoft.com/office/officeart/2005/8/layout/hProcess4"/>
+    <dgm:cxn modelId="{06218E6B-E377-4F84-848C-5B47FC2E9516}" srcId="{A90E3BAF-857D-4B81-92B1-5BAB3238E52E}" destId="{8010C29B-2B30-46F9-BA16-D8F7C3E4E080}" srcOrd="1" destOrd="0" parTransId="{F8AB23FE-222B-4957-B9D7-09956E9DC498}" sibTransId="{4A5AC81D-889E-4A5D-91CC-054159E1EDBD}"/>
+    <dgm:cxn modelId="{6C2EB859-6EF6-457E-8D21-CE0848B587B0}" type="presOf" srcId="{A90E3BAF-857D-4B81-92B1-5BAB3238E52E}" destId="{96285BD0-5EA1-4D86-B3DB-1991FE767EFF}" srcOrd="0" destOrd="0" presId="urn:microsoft.com/office/officeart/2005/8/layout/hProcess4"/>
     <dgm:cxn modelId="{0D52A72D-F795-4BC9-8BD0-E1D25D55366F}" srcId="{A90E3BAF-857D-4B81-92B1-5BAB3238E52E}" destId="{32CA4D76-14D8-4192-9A09-33DB59083F97}" srcOrd="0" destOrd="0" parTransId="{41ED0D85-AD05-4D4D-BCB5-6DECB80F5388}" sibTransId="{45559F0F-76D7-4612-B5A4-2FB9ADE5042E}"/>
-    <dgm:cxn modelId="{FD985CE2-8DF1-4833-9A57-31452F2BFBA3}" type="presOf" srcId="{C27831E2-64FF-4A27-9EE3-529C4B2FEAB3}" destId="{D8D16547-77BA-44E5-B855-3EA684E0178F}" srcOrd="0" destOrd="0" presId="urn:microsoft.com/office/officeart/2005/8/layout/hProcess4"/>
-    <dgm:cxn modelId="{EB14D925-A931-4F62-B1DC-CE2F23F1310C}" type="presOf" srcId="{45559F0F-76D7-4612-B5A4-2FB9ADE5042E}" destId="{2386F077-50CF-4EDD-BD4D-9032B62F1C8F}" srcOrd="0" destOrd="0" presId="urn:microsoft.com/office/officeart/2005/8/layout/hProcess4"/>
-    <dgm:cxn modelId="{A5767D4E-9264-42EB-BFC7-7768F252C0CA}" type="presOf" srcId="{3866131A-3D92-4B08-910D-111E41851DA7}" destId="{298C4B9C-04DF-4B94-8FB4-7F300C0FC7BA}" srcOrd="1" destOrd="1" presId="urn:microsoft.com/office/officeart/2005/8/layout/hProcess4"/>
-    <dgm:cxn modelId="{0044E2C0-FB31-4986-A3D6-A61FB903459D}" type="presOf" srcId="{8010C29B-2B30-46F9-BA16-D8F7C3E4E080}" destId="{8EB404DE-7F61-4874-B161-31D7C2A524CA}" srcOrd="0" destOrd="0" presId="urn:microsoft.com/office/officeart/2005/8/layout/hProcess4"/>
-    <dgm:cxn modelId="{6C2EB859-6EF6-457E-8D21-CE0848B587B0}" type="presOf" srcId="{A90E3BAF-857D-4B81-92B1-5BAB3238E52E}" destId="{96285BD0-5EA1-4D86-B3DB-1991FE767EFF}" srcOrd="0" destOrd="0" presId="urn:microsoft.com/office/officeart/2005/8/layout/hProcess4"/>
-    <dgm:cxn modelId="{627BFB97-37AC-460F-909F-7B162C4435DB}" srcId="{32CA4D76-14D8-4192-9A09-33DB59083F97}" destId="{4A3898C0-A95E-494E-94C1-76A57A5BCF9F}" srcOrd="0" destOrd="0" parTransId="{98BADDED-3554-4D76-BC17-0FFB90747C3E}" sibTransId="{8380947C-4540-4283-B124-B1F3C8FF777D}"/>
+    <dgm:cxn modelId="{9DB4E060-894D-4CA2-8B96-C960190D2043}" srcId="{C27831E2-64FF-4A27-9EE3-529C4B2FEAB3}" destId="{3866131A-3D92-4B08-910D-111E41851DA7}" srcOrd="1" destOrd="0" parTransId="{03C7D54E-02AC-45D2-BEA5-0BABE7CA1A10}" sibTransId="{736D1FEE-3891-466F-B16E-56317979B9D0}"/>
     <dgm:cxn modelId="{157A606A-F338-42D3-8462-B2691B8B958F}" srcId="{C27831E2-64FF-4A27-9EE3-529C4B2FEAB3}" destId="{E0AEA09B-6124-4017-A4FA-89B2821F2134}" srcOrd="0" destOrd="0" parTransId="{B7AB71BD-6840-4C78-8B13-5CDECC61391F}" sibTransId="{49D561B6-9E07-4087-8363-10C9A3153C19}"/>
-    <dgm:cxn modelId="{CBDF25D7-2B88-4B3C-BCB7-0B170A0667BB}" type="presOf" srcId="{610A53F2-A3C9-409D-9390-FD75E79349CF}" destId="{DE740FC7-95C6-4631-98E6-40B946E4011A}" srcOrd="0" destOrd="0" presId="urn:microsoft.com/office/officeart/2005/8/layout/hProcess4"/>
-    <dgm:cxn modelId="{9DB4E060-894D-4CA2-8B96-C960190D2043}" srcId="{C27831E2-64FF-4A27-9EE3-529C4B2FEAB3}" destId="{3866131A-3D92-4B08-910D-111E41851DA7}" srcOrd="1" destOrd="0" parTransId="{03C7D54E-02AC-45D2-BEA5-0BABE7CA1A10}" sibTransId="{736D1FEE-3891-466F-B16E-56317979B9D0}"/>
+    <dgm:cxn modelId="{37161AA7-ADA1-4B5D-96C0-63C230DD6C54}" srcId="{A90E3BAF-857D-4B81-92B1-5BAB3238E52E}" destId="{C27831E2-64FF-4A27-9EE3-529C4B2FEAB3}" srcOrd="2" destOrd="0" parTransId="{BEC22412-384F-41A2-86E7-0126DA2FD00C}" sibTransId="{7B00AAC3-64CE-4CC6-A5BD-601F108580FD}"/>
     <dgm:cxn modelId="{F666831B-C3C8-4190-9E6A-C603BF41F555}" type="presOf" srcId="{4A3898C0-A95E-494E-94C1-76A57A5BCF9F}" destId="{844A1EAB-F528-448D-825A-5A3848B97629}" srcOrd="0" destOrd="0" presId="urn:microsoft.com/office/officeart/2005/8/layout/hProcess4"/>
-    <dgm:cxn modelId="{F9516AC0-BB3A-43AF-A213-4EAD47EE93E8}" type="presOf" srcId="{3866131A-3D92-4B08-910D-111E41851DA7}" destId="{8C179D1E-B983-4B39-B4F3-E320103C0EF0}" srcOrd="0" destOrd="1" presId="urn:microsoft.com/office/officeart/2005/8/layout/hProcess4"/>
-    <dgm:cxn modelId="{5BCC97D7-C83B-44FA-894B-6830BA707488}" type="presOf" srcId="{4A5AC81D-889E-4A5D-91CC-054159E1EDBD}" destId="{A4FB0482-F0ED-46E6-996E-80CC4EE28852}" srcOrd="0" destOrd="0" presId="urn:microsoft.com/office/officeart/2005/8/layout/hProcess4"/>
-    <dgm:cxn modelId="{8C8DE138-F128-4699-BD74-F88AA046A158}" type="presOf" srcId="{32CA4D76-14D8-4192-9A09-33DB59083F97}" destId="{2F0F5878-9767-4725-AC93-30AE560420E6}" srcOrd="0" destOrd="0" presId="urn:microsoft.com/office/officeart/2005/8/layout/hProcess4"/>
-    <dgm:cxn modelId="{7459170A-DA57-4B0A-A7AA-2F1816AEDF3D}" type="presOf" srcId="{610A53F2-A3C9-409D-9390-FD75E79349CF}" destId="{F9B84B71-D04E-466D-9A44-C37C0F6F9DBE}" srcOrd="1" destOrd="0" presId="urn:microsoft.com/office/officeart/2005/8/layout/hProcess4"/>
-    <dgm:cxn modelId="{01DD0AB7-9FE1-43CD-96E4-C6BB33B4C2F6}" type="presOf" srcId="{E0AEA09B-6124-4017-A4FA-89B2821F2134}" destId="{298C4B9C-04DF-4B94-8FB4-7F300C0FC7BA}" srcOrd="1" destOrd="0" presId="urn:microsoft.com/office/officeart/2005/8/layout/hProcess4"/>
-    <dgm:cxn modelId="{D8D8FF00-A588-45DE-ADFA-2A92C5E94649}" type="presOf" srcId="{E0AEA09B-6124-4017-A4FA-89B2821F2134}" destId="{8C179D1E-B983-4B39-B4F3-E320103C0EF0}" srcOrd="0" destOrd="0" presId="urn:microsoft.com/office/officeart/2005/8/layout/hProcess4"/>
-    <dgm:cxn modelId="{06218E6B-E377-4F84-848C-5B47FC2E9516}" srcId="{A90E3BAF-857D-4B81-92B1-5BAB3238E52E}" destId="{8010C29B-2B30-46F9-BA16-D8F7C3E4E080}" srcOrd="1" destOrd="0" parTransId="{F8AB23FE-222B-4957-B9D7-09956E9DC498}" sibTransId="{4A5AC81D-889E-4A5D-91CC-054159E1EDBD}"/>
-    <dgm:cxn modelId="{37161AA7-ADA1-4B5D-96C0-63C230DD6C54}" srcId="{A90E3BAF-857D-4B81-92B1-5BAB3238E52E}" destId="{C27831E2-64FF-4A27-9EE3-529C4B2FEAB3}" srcOrd="2" destOrd="0" parTransId="{BEC22412-384F-41A2-86E7-0126DA2FD00C}" sibTransId="{7B00AAC3-64CE-4CC6-A5BD-601F108580FD}"/>
-    <dgm:cxn modelId="{81E4387C-152E-478E-B941-78363690FFC3}" srcId="{8010C29B-2B30-46F9-BA16-D8F7C3E4E080}" destId="{610A53F2-A3C9-409D-9390-FD75E79349CF}" srcOrd="0" destOrd="0" parTransId="{72E9AB30-5D5C-4963-B473-2ED716477B3C}" sibTransId="{2755FA1F-FE51-4E21-BB40-1EDF7CBDBBCA}"/>
-    <dgm:cxn modelId="{2FAB9263-57E9-49FF-952E-645CD38E25F8}" type="presOf" srcId="{4A3898C0-A95E-494E-94C1-76A57A5BCF9F}" destId="{54F7EA9F-2E08-4CD4-976E-2A0144297398}" srcOrd="1" destOrd="0" presId="urn:microsoft.com/office/officeart/2005/8/layout/hProcess4"/>
     <dgm:cxn modelId="{598E2F66-D9A2-40C5-82E8-C8D0638C0D74}" type="presParOf" srcId="{96285BD0-5EA1-4D86-B3DB-1991FE767EFF}" destId="{17F7666B-F440-4E6C-BAC8-DBED384A533C}" srcOrd="0" destOrd="0" presId="urn:microsoft.com/office/officeart/2005/8/layout/hProcess4"/>
     <dgm:cxn modelId="{72A20450-581A-484A-959D-0AFE1B652517}" type="presParOf" srcId="{96285BD0-5EA1-4D86-B3DB-1991FE767EFF}" destId="{765D6404-5573-4DD8-BEF5-923C167DB65D}" srcOrd="1" destOrd="0" presId="urn:microsoft.com/office/officeart/2005/8/layout/hProcess4"/>
     <dgm:cxn modelId="{921B3E05-9FCD-4028-A7F1-5A8D17592BDB}" type="presParOf" srcId="{96285BD0-5EA1-4D86-B3DB-1991FE767EFF}" destId="{D37A6572-1D43-4AA1-A0D2-B9DE018C7A72}" srcOrd="2" destOrd="0" presId="urn:microsoft.com/office/officeart/2005/8/layout/hProcess4"/>
@@ -3521,6 +3567,13 @@
         </dgm:presLayoutVars>
       </dgm:prSet>
       <dgm:spPr/>
+      <dgm:t>
+        <a:bodyPr/>
+        <a:lstStyle/>
+        <a:p>
+          <a:endParaRPr lang="en-GB"/>
+        </a:p>
+      </dgm:t>
     </dgm:pt>
     <dgm:pt modelId="{AAE576E3-F36F-4632-99E4-9872D89E1A9B}" type="pres">
       <dgm:prSet presAssocID="{4F7D6F58-4315-45F7-9B85-C84CE1377EB1}" presName="tSp" presStyleCnt="0"/>
@@ -3580,6 +3633,13 @@
         </dgm:presLayoutVars>
       </dgm:prSet>
       <dgm:spPr/>
+      <dgm:t>
+        <a:bodyPr/>
+        <a:lstStyle/>
+        <a:p>
+          <a:endParaRPr lang="en-GB"/>
+        </a:p>
+      </dgm:t>
     </dgm:pt>
     <dgm:pt modelId="{E16CB612-42F3-4A1C-9CF9-EB2D06B8CAAB}" type="pres">
       <dgm:prSet presAssocID="{AC7A9309-F0D7-4B58-BA7A-18BFF816AE59}" presName="connSite1" presStyleCnt="0"/>
@@ -3588,6 +3648,13 @@
     <dgm:pt modelId="{A2D4682B-F727-40C8-9E80-92958191D595}" type="pres">
       <dgm:prSet presAssocID="{7C3138E7-AD94-4DAD-9340-1D677BE90AB4}" presName="Name9" presStyleLbl="sibTrans2D1" presStyleIdx="0" presStyleCnt="2"/>
       <dgm:spPr/>
+      <dgm:t>
+        <a:bodyPr/>
+        <a:lstStyle/>
+        <a:p>
+          <a:endParaRPr lang="en-GB"/>
+        </a:p>
+      </dgm:t>
     </dgm:pt>
     <dgm:pt modelId="{7BF2C480-2A2E-4E6F-9CFF-508C3DDA8B8A}" type="pres">
       <dgm:prSet presAssocID="{AFC1021B-A036-468B-ADC4-1A41BE4CD50E}" presName="composite2" presStyleCnt="0"/>
@@ -3650,6 +3717,13 @@
     <dgm:pt modelId="{DDF0DB4A-6A98-480E-9976-14EF41A8614C}" type="pres">
       <dgm:prSet presAssocID="{A131392C-451F-45EE-A172-D58B5BA06BBB}" presName="Name18" presStyleLbl="sibTrans2D1" presStyleIdx="1" presStyleCnt="2"/>
       <dgm:spPr/>
+      <dgm:t>
+        <a:bodyPr/>
+        <a:lstStyle/>
+        <a:p>
+          <a:endParaRPr lang="en-GB"/>
+        </a:p>
+      </dgm:t>
     </dgm:pt>
     <dgm:pt modelId="{3F59CC69-8A0D-4360-9EC9-1304ED6FFF59}" type="pres">
       <dgm:prSet presAssocID="{14799131-FF37-4319-90A9-04D8618D774F}" presName="composite1" presStyleCnt="0"/>
@@ -3697,6 +3771,13 @@
         </dgm:presLayoutVars>
       </dgm:prSet>
       <dgm:spPr/>
+      <dgm:t>
+        <a:bodyPr/>
+        <a:lstStyle/>
+        <a:p>
+          <a:endParaRPr lang="en-GB"/>
+        </a:p>
+      </dgm:t>
     </dgm:pt>
     <dgm:pt modelId="{55AA1D54-EE77-4E4D-9B55-5624B7687CFB}" type="pres">
       <dgm:prSet presAssocID="{14799131-FF37-4319-90A9-04D8618D774F}" presName="connSite1" presStyleCnt="0"/>
@@ -3704,24 +3785,24 @@
     </dgm:pt>
   </dgm:ptLst>
   <dgm:cxnLst>
+    <dgm:cxn modelId="{D58A6B21-D9F0-4C36-BAE8-64A2AC210797}" type="presOf" srcId="{EE2EBB22-57FE-4EDA-83E8-A3997045DE4B}" destId="{0F46FA40-2E66-414F-9211-241C8FAB6B3E}" srcOrd="0" destOrd="0" presId="urn:microsoft.com/office/officeart/2005/8/layout/hProcess4"/>
+    <dgm:cxn modelId="{31087424-4A1A-43BF-823E-E2DA1D37EF64}" type="presOf" srcId="{AFC1021B-A036-468B-ADC4-1A41BE4CD50E}" destId="{DF9BDCF0-4FE5-4CDA-A1AD-B617A34E54CF}" srcOrd="0" destOrd="0" presId="urn:microsoft.com/office/officeart/2005/8/layout/hProcess4"/>
+    <dgm:cxn modelId="{AEA3E681-0F7F-4D89-A82C-589840CD06AA}" type="presOf" srcId="{A131392C-451F-45EE-A172-D58B5BA06BBB}" destId="{DDF0DB4A-6A98-480E-9976-14EF41A8614C}" srcOrd="0" destOrd="0" presId="urn:microsoft.com/office/officeart/2005/8/layout/hProcess4"/>
+    <dgm:cxn modelId="{95966442-2108-47AB-A49E-6E3EB5401E55}" type="presOf" srcId="{C0608C84-91C8-4297-9E5F-D1B191458FE7}" destId="{87758B86-A1A1-47FE-8CAF-15203182D5D6}" srcOrd="0" destOrd="0" presId="urn:microsoft.com/office/officeart/2005/8/layout/hProcess4"/>
+    <dgm:cxn modelId="{29C00153-26ED-4F1A-8CAE-2680F1246F13}" type="presOf" srcId="{968884E3-2E57-426D-BB20-9594C43E0923}" destId="{7A3DD079-320D-44A5-B8B1-07B14114D6A3}" srcOrd="1" destOrd="0" presId="urn:microsoft.com/office/officeart/2005/8/layout/hProcess4"/>
     <dgm:cxn modelId="{B1443892-B0E8-42E6-BD0F-BEC0B69C095C}" srcId="{AFC1021B-A036-468B-ADC4-1A41BE4CD50E}" destId="{C0608C84-91C8-4297-9E5F-D1B191458FE7}" srcOrd="0" destOrd="0" parTransId="{D0BB2162-DFC3-4FBB-A60E-89AD71C568C4}" sibTransId="{C7E742C5-C842-47F9-BFC2-6162E78956F1}"/>
     <dgm:cxn modelId="{DC4AF2EC-2978-4BDF-A46E-BFED7F10D4BD}" srcId="{4F7D6F58-4315-45F7-9B85-C84CE1377EB1}" destId="{AC7A9309-F0D7-4B58-BA7A-18BFF816AE59}" srcOrd="0" destOrd="0" parTransId="{5F25BB1D-49EF-4280-A6A4-976E2A4E7DEA}" sibTransId="{7C3138E7-AD94-4DAD-9340-1D677BE90AB4}"/>
-    <dgm:cxn modelId="{D58A6B21-D9F0-4C36-BAE8-64A2AC210797}" type="presOf" srcId="{EE2EBB22-57FE-4EDA-83E8-A3997045DE4B}" destId="{0F46FA40-2E66-414F-9211-241C8FAB6B3E}" srcOrd="0" destOrd="0" presId="urn:microsoft.com/office/officeart/2005/8/layout/hProcess4"/>
-    <dgm:cxn modelId="{AEA3E681-0F7F-4D89-A82C-589840CD06AA}" type="presOf" srcId="{A131392C-451F-45EE-A172-D58B5BA06BBB}" destId="{DDF0DB4A-6A98-480E-9976-14EF41A8614C}" srcOrd="0" destOrd="0" presId="urn:microsoft.com/office/officeart/2005/8/layout/hProcess4"/>
+    <dgm:cxn modelId="{99232200-CAA6-4DDB-B8EC-FFAA61653B64}" type="presOf" srcId="{7C3138E7-AD94-4DAD-9340-1D677BE90AB4}" destId="{A2D4682B-F727-40C8-9E80-92958191D595}" srcOrd="0" destOrd="0" presId="urn:microsoft.com/office/officeart/2005/8/layout/hProcess4"/>
+    <dgm:cxn modelId="{2EEB7513-23C0-4366-B7F7-B0B204677028}" srcId="{4F7D6F58-4315-45F7-9B85-C84CE1377EB1}" destId="{AFC1021B-A036-468B-ADC4-1A41BE4CD50E}" srcOrd="1" destOrd="0" parTransId="{4E6E1ABF-23B0-4770-8FE8-0F215DE9E439}" sibTransId="{A131392C-451F-45EE-A172-D58B5BA06BBB}"/>
+    <dgm:cxn modelId="{725435E0-1228-44F9-85A6-9E913368E8F3}" type="presOf" srcId="{EE2EBB22-57FE-4EDA-83E8-A3997045DE4B}" destId="{288D4756-815B-4745-817A-975FDBD3ACB0}" srcOrd="1" destOrd="0" presId="urn:microsoft.com/office/officeart/2005/8/layout/hProcess4"/>
+    <dgm:cxn modelId="{193B7B0C-BC49-4A8A-9AD1-4B469FA72FB9}" type="presOf" srcId="{AC7A9309-F0D7-4B58-BA7A-18BFF816AE59}" destId="{2B2A3FFC-B337-494F-A4B0-B6330BA78E6B}" srcOrd="0" destOrd="0" presId="urn:microsoft.com/office/officeart/2005/8/layout/hProcess4"/>
+    <dgm:cxn modelId="{F48499CA-C6D6-49DF-8AE6-89CEAF939986}" type="presOf" srcId="{4F7D6F58-4315-45F7-9B85-C84CE1377EB1}" destId="{A71A6382-3A15-41CC-A6F5-CDC63A7867E7}" srcOrd="0" destOrd="0" presId="urn:microsoft.com/office/officeart/2005/8/layout/hProcess4"/>
+    <dgm:cxn modelId="{3853EADA-3A9F-4105-9987-841170C21F08}" type="presOf" srcId="{14799131-FF37-4319-90A9-04D8618D774F}" destId="{AFEC09BB-C8DF-43FF-8D40-D892841837D1}" srcOrd="0" destOrd="0" presId="urn:microsoft.com/office/officeart/2005/8/layout/hProcess4"/>
+    <dgm:cxn modelId="{D15BD1CD-BD5F-4E27-9490-C52A980ED06A}" type="presOf" srcId="{C0608C84-91C8-4297-9E5F-D1B191458FE7}" destId="{850A31EA-F682-4222-B9C4-55D56181184B}" srcOrd="1" destOrd="0" presId="urn:microsoft.com/office/officeart/2005/8/layout/hProcess4"/>
+    <dgm:cxn modelId="{BE698DCE-BE4C-447B-9BA4-0FEFB832399B}" type="presOf" srcId="{968884E3-2E57-426D-BB20-9594C43E0923}" destId="{494DD3FB-5C52-4C7D-923C-754099418BB4}" srcOrd="0" destOrd="0" presId="urn:microsoft.com/office/officeart/2005/8/layout/hProcess4"/>
+    <dgm:cxn modelId="{706515B4-0EE8-41BF-A275-FB639BBF5C06}" srcId="{AC7A9309-F0D7-4B58-BA7A-18BFF816AE59}" destId="{EE2EBB22-57FE-4EDA-83E8-A3997045DE4B}" srcOrd="0" destOrd="0" parTransId="{15518D23-8957-4BF9-B1ED-BC7685DF06C9}" sibTransId="{9C657136-27AE-4DE1-B0A7-A0C1FF391411}"/>
+    <dgm:cxn modelId="{E6E44D03-BDF0-45F9-8CA7-F813214BC00E}" srcId="{4F7D6F58-4315-45F7-9B85-C84CE1377EB1}" destId="{14799131-FF37-4319-90A9-04D8618D774F}" srcOrd="2" destOrd="0" parTransId="{61181783-EF52-4AD7-987D-865933CDEC51}" sibTransId="{39E90E9D-F7B5-4B9A-AA19-61E4CC675D13}"/>
     <dgm:cxn modelId="{50A74AA0-C2C5-4568-B55C-B455690EF811}" srcId="{14799131-FF37-4319-90A9-04D8618D774F}" destId="{968884E3-2E57-426D-BB20-9594C43E0923}" srcOrd="0" destOrd="0" parTransId="{E6C886EE-2628-4201-96F7-21B3036F19F2}" sibTransId="{9CCFA48A-0162-4EAA-B9B3-6E28BFC61201}"/>
-    <dgm:cxn modelId="{706515B4-0EE8-41BF-A275-FB639BBF5C06}" srcId="{AC7A9309-F0D7-4B58-BA7A-18BFF816AE59}" destId="{EE2EBB22-57FE-4EDA-83E8-A3997045DE4B}" srcOrd="0" destOrd="0" parTransId="{15518D23-8957-4BF9-B1ED-BC7685DF06C9}" sibTransId="{9C657136-27AE-4DE1-B0A7-A0C1FF391411}"/>
-    <dgm:cxn modelId="{31087424-4A1A-43BF-823E-E2DA1D37EF64}" type="presOf" srcId="{AFC1021B-A036-468B-ADC4-1A41BE4CD50E}" destId="{DF9BDCF0-4FE5-4CDA-A1AD-B617A34E54CF}" srcOrd="0" destOrd="0" presId="urn:microsoft.com/office/officeart/2005/8/layout/hProcess4"/>
-    <dgm:cxn modelId="{D15BD1CD-BD5F-4E27-9490-C52A980ED06A}" type="presOf" srcId="{C0608C84-91C8-4297-9E5F-D1B191458FE7}" destId="{850A31EA-F682-4222-B9C4-55D56181184B}" srcOrd="1" destOrd="0" presId="urn:microsoft.com/office/officeart/2005/8/layout/hProcess4"/>
-    <dgm:cxn modelId="{95966442-2108-47AB-A49E-6E3EB5401E55}" type="presOf" srcId="{C0608C84-91C8-4297-9E5F-D1B191458FE7}" destId="{87758B86-A1A1-47FE-8CAF-15203182D5D6}" srcOrd="0" destOrd="0" presId="urn:microsoft.com/office/officeart/2005/8/layout/hProcess4"/>
-    <dgm:cxn modelId="{BE698DCE-BE4C-447B-9BA4-0FEFB832399B}" type="presOf" srcId="{968884E3-2E57-426D-BB20-9594C43E0923}" destId="{494DD3FB-5C52-4C7D-923C-754099418BB4}" srcOrd="0" destOrd="0" presId="urn:microsoft.com/office/officeart/2005/8/layout/hProcess4"/>
-    <dgm:cxn modelId="{F48499CA-C6D6-49DF-8AE6-89CEAF939986}" type="presOf" srcId="{4F7D6F58-4315-45F7-9B85-C84CE1377EB1}" destId="{A71A6382-3A15-41CC-A6F5-CDC63A7867E7}" srcOrd="0" destOrd="0" presId="urn:microsoft.com/office/officeart/2005/8/layout/hProcess4"/>
-    <dgm:cxn modelId="{E6E44D03-BDF0-45F9-8CA7-F813214BC00E}" srcId="{4F7D6F58-4315-45F7-9B85-C84CE1377EB1}" destId="{14799131-FF37-4319-90A9-04D8618D774F}" srcOrd="2" destOrd="0" parTransId="{61181783-EF52-4AD7-987D-865933CDEC51}" sibTransId="{39E90E9D-F7B5-4B9A-AA19-61E4CC675D13}"/>
-    <dgm:cxn modelId="{193B7B0C-BC49-4A8A-9AD1-4B469FA72FB9}" type="presOf" srcId="{AC7A9309-F0D7-4B58-BA7A-18BFF816AE59}" destId="{2B2A3FFC-B337-494F-A4B0-B6330BA78E6B}" srcOrd="0" destOrd="0" presId="urn:microsoft.com/office/officeart/2005/8/layout/hProcess4"/>
-    <dgm:cxn modelId="{3853EADA-3A9F-4105-9987-841170C21F08}" type="presOf" srcId="{14799131-FF37-4319-90A9-04D8618D774F}" destId="{AFEC09BB-C8DF-43FF-8D40-D892841837D1}" srcOrd="0" destOrd="0" presId="urn:microsoft.com/office/officeart/2005/8/layout/hProcess4"/>
-    <dgm:cxn modelId="{99232200-CAA6-4DDB-B8EC-FFAA61653B64}" type="presOf" srcId="{7C3138E7-AD94-4DAD-9340-1D677BE90AB4}" destId="{A2D4682B-F727-40C8-9E80-92958191D595}" srcOrd="0" destOrd="0" presId="urn:microsoft.com/office/officeart/2005/8/layout/hProcess4"/>
-    <dgm:cxn modelId="{725435E0-1228-44F9-85A6-9E913368E8F3}" type="presOf" srcId="{EE2EBB22-57FE-4EDA-83E8-A3997045DE4B}" destId="{288D4756-815B-4745-817A-975FDBD3ACB0}" srcOrd="1" destOrd="0" presId="urn:microsoft.com/office/officeart/2005/8/layout/hProcess4"/>
-    <dgm:cxn modelId="{29C00153-26ED-4F1A-8CAE-2680F1246F13}" type="presOf" srcId="{968884E3-2E57-426D-BB20-9594C43E0923}" destId="{7A3DD079-320D-44A5-B8B1-07B14114D6A3}" srcOrd="1" destOrd="0" presId="urn:microsoft.com/office/officeart/2005/8/layout/hProcess4"/>
-    <dgm:cxn modelId="{2EEB7513-23C0-4366-B7F7-B0B204677028}" srcId="{4F7D6F58-4315-45F7-9B85-C84CE1377EB1}" destId="{AFC1021B-A036-468B-ADC4-1A41BE4CD50E}" srcOrd="1" destOrd="0" parTransId="{4E6E1ABF-23B0-4770-8FE8-0F215DE9E439}" sibTransId="{A131392C-451F-45EE-A172-D58B5BA06BBB}"/>
     <dgm:cxn modelId="{43C20E2E-4841-4B2F-8871-2E6F754DFA20}" type="presParOf" srcId="{A71A6382-3A15-41CC-A6F5-CDC63A7867E7}" destId="{AAE576E3-F36F-4632-99E4-9872D89E1A9B}" srcOrd="0" destOrd="0" presId="urn:microsoft.com/office/officeart/2005/8/layout/hProcess4"/>
     <dgm:cxn modelId="{EAC7E12D-767C-4508-B86A-B5423E8CD97F}" type="presParOf" srcId="{A71A6382-3A15-41CC-A6F5-CDC63A7867E7}" destId="{230231ED-2940-456F-9AB9-D96E46046084}" srcOrd="1" destOrd="0" presId="urn:microsoft.com/office/officeart/2005/8/layout/hProcess4"/>
     <dgm:cxn modelId="{E319BC1C-8FFF-453F-A746-803B539D4C4D}" type="presParOf" srcId="{A71A6382-3A15-41CC-A6F5-CDC63A7867E7}" destId="{934CCCAC-ECDD-4861-B3B6-1F9AD1BEADC9}" srcOrd="2" destOrd="0" presId="urn:microsoft.com/office/officeart/2005/8/layout/hProcess4"/>
@@ -10520,7 +10601,7 @@
           <a:p>
             <a:fld id="{AD9AE32F-C0D4-4EF2-8834-A61D40905297}" type="slidenum">
               <a:rPr lang="en-GB" smtClean="0"/>
-              <a:t>10</a:t>
+              <a:t>11</a:t>
             </a:fld>
             <a:endParaRPr lang="en-GB"/>
           </a:p>
@@ -10642,7 +10723,7 @@
           <a:p>
             <a:fld id="{AD9AE32F-C0D4-4EF2-8834-A61D40905297}" type="slidenum">
               <a:rPr lang="en-GB" smtClean="0"/>
-              <a:t>11</a:t>
+              <a:t>12</a:t>
             </a:fld>
             <a:endParaRPr lang="en-GB"/>
           </a:p>
@@ -10828,7 +10909,7 @@
           <a:p>
             <a:fld id="{AD9AE32F-C0D4-4EF2-8834-A61D40905297}" type="slidenum">
               <a:rPr lang="en-GB" smtClean="0"/>
-              <a:t>12</a:t>
+              <a:t>13</a:t>
             </a:fld>
             <a:endParaRPr lang="en-GB"/>
           </a:p>
@@ -10947,7 +11028,7 @@
           <a:p>
             <a:fld id="{AD9AE32F-C0D4-4EF2-8834-A61D40905297}" type="slidenum">
               <a:rPr lang="en-GB" smtClean="0"/>
-              <a:t>13</a:t>
+              <a:t>14</a:t>
             </a:fld>
             <a:endParaRPr lang="en-GB"/>
           </a:p>
@@ -11031,7 +11112,7 @@
           <a:p>
             <a:fld id="{AD9AE32F-C0D4-4EF2-8834-A61D40905297}" type="slidenum">
               <a:rPr lang="en-GB" smtClean="0"/>
-              <a:t>14</a:t>
+              <a:t>15</a:t>
             </a:fld>
             <a:endParaRPr lang="en-GB"/>
           </a:p>
@@ -11115,7 +11196,7 @@
           <a:p>
             <a:fld id="{AD9AE32F-C0D4-4EF2-8834-A61D40905297}" type="slidenum">
               <a:rPr lang="en-GB" smtClean="0"/>
-              <a:t>15</a:t>
+              <a:t>16</a:t>
             </a:fld>
             <a:endParaRPr lang="en-GB"/>
           </a:p>
@@ -11199,7 +11280,7 @@
           <a:p>
             <a:fld id="{AD9AE32F-C0D4-4EF2-8834-A61D40905297}" type="slidenum">
               <a:rPr lang="en-GB" smtClean="0"/>
-              <a:t>16</a:t>
+              <a:t>17</a:t>
             </a:fld>
             <a:endParaRPr lang="en-GB"/>
           </a:p>
@@ -11319,7 +11400,7 @@
           <a:p>
             <a:fld id="{AD9AE32F-C0D4-4EF2-8834-A61D40905297}" type="slidenum">
               <a:rPr lang="en-GB" smtClean="0"/>
-              <a:t>17</a:t>
+              <a:t>18</a:t>
             </a:fld>
             <a:endParaRPr lang="en-GB"/>
           </a:p>
@@ -11434,7 +11515,7 @@
           <a:p>
             <a:fld id="{AD9AE32F-C0D4-4EF2-8834-A61D40905297}" type="slidenum">
               <a:rPr lang="en-GB" smtClean="0"/>
-              <a:t>18</a:t>
+              <a:t>19</a:t>
             </a:fld>
             <a:endParaRPr lang="en-GB"/>
           </a:p>
@@ -11568,7 +11649,7 @@
           <a:p>
             <a:fld id="{AD9AE32F-C0D4-4EF2-8834-A61D40905297}" type="slidenum">
               <a:rPr lang="en-GB" smtClean="0"/>
-              <a:t>20</a:t>
+              <a:t>21</a:t>
             </a:fld>
             <a:endParaRPr lang="en-GB"/>
           </a:p>
@@ -11788,7 +11869,7 @@
           <a:p>
             <a:fld id="{AD9AE32F-C0D4-4EF2-8834-A61D40905297}" type="slidenum">
               <a:rPr lang="en-GB" smtClean="0"/>
-              <a:t>21</a:t>
+              <a:t>22</a:t>
             </a:fld>
             <a:endParaRPr lang="en-GB"/>
           </a:p>
@@ -11923,7 +12004,7 @@
           <a:p>
             <a:fld id="{AD9AE32F-C0D4-4EF2-8834-A61D40905297}" type="slidenum">
               <a:rPr lang="en-GB" smtClean="0"/>
-              <a:t>23</a:t>
+              <a:t>24</a:t>
             </a:fld>
             <a:endParaRPr lang="en-GB"/>
           </a:p>
@@ -12636,7 +12717,7 @@
           <a:p>
             <a:fld id="{AD9AE32F-C0D4-4EF2-8834-A61D40905297}" type="slidenum">
               <a:rPr lang="en-GB" smtClean="0"/>
-              <a:t>8</a:t>
+              <a:t>9</a:t>
             </a:fld>
             <a:endParaRPr lang="en-GB"/>
           </a:p>
@@ -12736,7 +12817,7 @@
           <a:p>
             <a:fld id="{AD9AE32F-C0D4-4EF2-8834-A61D40905297}" type="slidenum">
               <a:rPr lang="en-GB" smtClean="0"/>
-              <a:t>9</a:t>
+              <a:t>10</a:t>
             </a:fld>
             <a:endParaRPr lang="en-GB"/>
           </a:p>
@@ -12812,7 +12893,7 @@
           <a:noFill/>
           <a:extLst>
             <a:ext uri="{909E8E84-426E-40dd-AFC4-6F175D3DCCD1}">
-              <a14:hiddenFill xmlns:a14="http://schemas.microsoft.com/office/drawing/2010/main" xmlns="">
+              <a14:hiddenFill xmlns="" xmlns:a14="http://schemas.microsoft.com/office/drawing/2010/main">
                 <a:solidFill>
                   <a:srgbClr val="FFFFFF"/>
                 </a:solidFill>
@@ -12871,7 +12952,7 @@
             </a:ln>
             <a:extLst>
               <a:ext uri="{91240B29-F687-4f45-9708-019B960494DF}">
-                <a14:hiddenLine xmlns:a14="http://schemas.microsoft.com/office/drawing/2010/main" xmlns="" w="9525">
+                <a14:hiddenLine xmlns="" xmlns:a14="http://schemas.microsoft.com/office/drawing/2010/main" w="9525">
                   <a:solidFill>
                     <a:srgbClr val="000000"/>
                   </a:solidFill>
@@ -12961,7 +13042,7 @@
             </a:ln>
             <a:extLst>
               <a:ext uri="{91240B29-F687-4f45-9708-019B960494DF}">
-                <a14:hiddenLine xmlns:a14="http://schemas.microsoft.com/office/drawing/2010/main" xmlns="" w="9525">
+                <a14:hiddenLine xmlns="" xmlns:a14="http://schemas.microsoft.com/office/drawing/2010/main" w="9525">
                   <a:solidFill>
                     <a:srgbClr val="000000"/>
                   </a:solidFill>
@@ -13051,7 +13132,7 @@
             </a:ln>
             <a:extLst>
               <a:ext uri="{91240B29-F687-4f45-9708-019B960494DF}">
-                <a14:hiddenLine xmlns:a14="http://schemas.microsoft.com/office/drawing/2010/main" xmlns="" w="9525">
+                <a14:hiddenLine xmlns="" xmlns:a14="http://schemas.microsoft.com/office/drawing/2010/main" w="9525">
                   <a:solidFill>
                     <a:srgbClr val="000000"/>
                   </a:solidFill>
@@ -13085,7 +13166,7 @@
             </a:ln>
             <a:extLst>
               <a:ext uri="{91240B29-F687-4f45-9708-019B960494DF}">
-                <a14:hiddenLine xmlns:a14="http://schemas.microsoft.com/office/drawing/2010/main" xmlns="" w="9525">
+                <a14:hiddenLine xmlns="" xmlns:a14="http://schemas.microsoft.com/office/drawing/2010/main" w="9525">
                   <a:solidFill>
                     <a:srgbClr val="000000"/>
                   </a:solidFill>
@@ -13175,7 +13256,7 @@
             </a:ln>
             <a:extLst>
               <a:ext uri="{91240B29-F687-4f45-9708-019B960494DF}">
-                <a14:hiddenLine xmlns:a14="http://schemas.microsoft.com/office/drawing/2010/main" xmlns="" w="9525">
+                <a14:hiddenLine xmlns="" xmlns:a14="http://schemas.microsoft.com/office/drawing/2010/main" w="9525">
                   <a:solidFill>
                     <a:srgbClr val="000000"/>
                   </a:solidFill>
@@ -13237,7 +13318,7 @@
             </a:ln>
             <a:extLst>
               <a:ext uri="{91240B29-F687-4f45-9708-019B960494DF}">
-                <a14:hiddenLine xmlns:a14="http://schemas.microsoft.com/office/drawing/2010/main" xmlns="" w="9525">
+                <a14:hiddenLine xmlns="" xmlns:a14="http://schemas.microsoft.com/office/drawing/2010/main" w="9525">
                   <a:solidFill>
                     <a:srgbClr val="000000"/>
                   </a:solidFill>
@@ -13299,7 +13380,7 @@
             </a:ln>
             <a:extLst>
               <a:ext uri="{91240B29-F687-4f45-9708-019B960494DF}">
-                <a14:hiddenLine xmlns:a14="http://schemas.microsoft.com/office/drawing/2010/main" xmlns="" w="9525">
+                <a14:hiddenLine xmlns="" xmlns:a14="http://schemas.microsoft.com/office/drawing/2010/main" w="9525">
                   <a:solidFill>
                     <a:srgbClr val="000000"/>
                   </a:solidFill>
@@ -13389,7 +13470,7 @@
             </a:ln>
             <a:extLst>
               <a:ext uri="{91240B29-F687-4f45-9708-019B960494DF}">
-                <a14:hiddenLine xmlns:a14="http://schemas.microsoft.com/office/drawing/2010/main" xmlns="" w="9525">
+                <a14:hiddenLine xmlns="" xmlns:a14="http://schemas.microsoft.com/office/drawing/2010/main" w="9525">
                   <a:solidFill>
                     <a:srgbClr val="000000"/>
                   </a:solidFill>
@@ -13451,7 +13532,7 @@
             </a:ln>
             <a:extLst>
               <a:ext uri="{91240B29-F687-4f45-9708-019B960494DF}">
-                <a14:hiddenLine xmlns:a14="http://schemas.microsoft.com/office/drawing/2010/main" xmlns="" w="9525">
+                <a14:hiddenLine xmlns="" xmlns:a14="http://schemas.microsoft.com/office/drawing/2010/main" w="9525">
                   <a:solidFill>
                     <a:srgbClr val="000000"/>
                   </a:solidFill>
@@ -13513,7 +13594,7 @@
             </a:ln>
             <a:extLst>
               <a:ext uri="{91240B29-F687-4f45-9708-019B960494DF}">
-                <a14:hiddenLine xmlns:a14="http://schemas.microsoft.com/office/drawing/2010/main" xmlns="" w="9525">
+                <a14:hiddenLine xmlns="" xmlns:a14="http://schemas.microsoft.com/office/drawing/2010/main" w="9525">
                   <a:solidFill>
                     <a:srgbClr val="000000"/>
                   </a:solidFill>
@@ -13603,7 +13684,7 @@
             </a:ln>
             <a:extLst>
               <a:ext uri="{91240B29-F687-4f45-9708-019B960494DF}">
-                <a14:hiddenLine xmlns:a14="http://schemas.microsoft.com/office/drawing/2010/main" xmlns="" w="9525">
+                <a14:hiddenLine xmlns="" xmlns:a14="http://schemas.microsoft.com/office/drawing/2010/main" w="9525">
                   <a:solidFill>
                     <a:srgbClr val="000000"/>
                   </a:solidFill>
@@ -13693,7 +13774,7 @@
             </a:ln>
             <a:extLst>
               <a:ext uri="{91240B29-F687-4f45-9708-019B960494DF}">
-                <a14:hiddenLine xmlns:a14="http://schemas.microsoft.com/office/drawing/2010/main" xmlns="" w="9525">
+                <a14:hiddenLine xmlns="" xmlns:a14="http://schemas.microsoft.com/office/drawing/2010/main" w="9525">
                   <a:solidFill>
                     <a:srgbClr val="000000"/>
                   </a:solidFill>
@@ -13755,7 +13836,7 @@
             </a:ln>
             <a:extLst>
               <a:ext uri="{91240B29-F687-4f45-9708-019B960494DF}">
-                <a14:hiddenLine xmlns:a14="http://schemas.microsoft.com/office/drawing/2010/main" xmlns="" w="9525">
+                <a14:hiddenLine xmlns="" xmlns:a14="http://schemas.microsoft.com/office/drawing/2010/main" w="9525">
                   <a:solidFill>
                     <a:srgbClr val="000000"/>
                   </a:solidFill>
@@ -13865,7 +13946,7 @@
             </a:ln>
             <a:extLst>
               <a:ext uri="{91240B29-F687-4f45-9708-019B960494DF}">
-                <a14:hiddenLine xmlns:a14="http://schemas.microsoft.com/office/drawing/2010/main" xmlns="" w="9525">
+                <a14:hiddenLine xmlns="" xmlns:a14="http://schemas.microsoft.com/office/drawing/2010/main" w="9525">
                   <a:solidFill>
                     <a:srgbClr val="000000"/>
                   </a:solidFill>
@@ -13927,7 +14008,7 @@
             </a:ln>
             <a:extLst>
               <a:ext uri="{91240B29-F687-4f45-9708-019B960494DF}">
-                <a14:hiddenLine xmlns:a14="http://schemas.microsoft.com/office/drawing/2010/main" xmlns="" w="9525">
+                <a14:hiddenLine xmlns="" xmlns:a14="http://schemas.microsoft.com/office/drawing/2010/main" w="9525">
                   <a:solidFill>
                     <a:srgbClr val="000000"/>
                   </a:solidFill>
@@ -14017,7 +14098,7 @@
             </a:ln>
             <a:extLst>
               <a:ext uri="{91240B29-F687-4f45-9708-019B960494DF}">
-                <a14:hiddenLine xmlns:a14="http://schemas.microsoft.com/office/drawing/2010/main" xmlns="" w="9525">
+                <a14:hiddenLine xmlns="" xmlns:a14="http://schemas.microsoft.com/office/drawing/2010/main" w="9525">
                   <a:solidFill>
                     <a:srgbClr val="000000"/>
                   </a:solidFill>
@@ -14107,7 +14188,7 @@
             </a:ln>
             <a:extLst>
               <a:ext uri="{91240B29-F687-4f45-9708-019B960494DF}">
-                <a14:hiddenLine xmlns:a14="http://schemas.microsoft.com/office/drawing/2010/main" xmlns="" w="9525">
+                <a14:hiddenLine xmlns="" xmlns:a14="http://schemas.microsoft.com/office/drawing/2010/main" w="9525">
                   <a:solidFill>
                     <a:srgbClr val="000000"/>
                   </a:solidFill>
@@ -14169,7 +14250,7 @@
             </a:ln>
             <a:extLst>
               <a:ext uri="{91240B29-F687-4f45-9708-019B960494DF}">
-                <a14:hiddenLine xmlns:a14="http://schemas.microsoft.com/office/drawing/2010/main" xmlns="" w="9525">
+                <a14:hiddenLine xmlns="" xmlns:a14="http://schemas.microsoft.com/office/drawing/2010/main" w="9525">
                   <a:solidFill>
                     <a:srgbClr val="000000"/>
                   </a:solidFill>
@@ -14259,7 +14340,7 @@
             </a:ln>
             <a:extLst>
               <a:ext uri="{91240B29-F687-4f45-9708-019B960494DF}">
-                <a14:hiddenLine xmlns:a14="http://schemas.microsoft.com/office/drawing/2010/main" xmlns="" w="9525">
+                <a14:hiddenLine xmlns="" xmlns:a14="http://schemas.microsoft.com/office/drawing/2010/main" w="9525">
                   <a:solidFill>
                     <a:srgbClr val="000000"/>
                   </a:solidFill>
@@ -14349,7 +14430,7 @@
             </a:ln>
             <a:extLst>
               <a:ext uri="{91240B29-F687-4f45-9708-019B960494DF}">
-                <a14:hiddenLine xmlns:a14="http://schemas.microsoft.com/office/drawing/2010/main" xmlns="" w="9525">
+                <a14:hiddenLine xmlns="" xmlns:a14="http://schemas.microsoft.com/office/drawing/2010/main" w="9525">
                   <a:solidFill>
                     <a:srgbClr val="000000"/>
                   </a:solidFill>
@@ -14405,7 +14486,7 @@
             </a:ln>
             <a:extLst>
               <a:ext uri="{91240B29-F687-4f45-9708-019B960494DF}">
-                <a14:hiddenLine xmlns:a14="http://schemas.microsoft.com/office/drawing/2010/main" xmlns="" w="9525">
+                <a14:hiddenLine xmlns="" xmlns:a14="http://schemas.microsoft.com/office/drawing/2010/main" w="9525">
                   <a:solidFill>
                     <a:srgbClr val="000000"/>
                   </a:solidFill>
@@ -14495,7 +14576,7 @@
             </a:ln>
             <a:extLst>
               <a:ext uri="{91240B29-F687-4f45-9708-019B960494DF}">
-                <a14:hiddenLine xmlns:a14="http://schemas.microsoft.com/office/drawing/2010/main" xmlns="" w="9525">
+                <a14:hiddenLine xmlns="" xmlns:a14="http://schemas.microsoft.com/office/drawing/2010/main" w="9525">
                   <a:solidFill>
                     <a:srgbClr val="000000"/>
                   </a:solidFill>
@@ -14551,7 +14632,7 @@
             </a:ln>
             <a:extLst>
               <a:ext uri="{91240B29-F687-4f45-9708-019B960494DF}">
-                <a14:hiddenLine xmlns:a14="http://schemas.microsoft.com/office/drawing/2010/main" xmlns="" w="9525">
+                <a14:hiddenLine xmlns="" xmlns:a14="http://schemas.microsoft.com/office/drawing/2010/main" w="9525">
                   <a:solidFill>
                     <a:srgbClr val="000000"/>
                   </a:solidFill>
@@ -14641,7 +14722,7 @@
             </a:ln>
             <a:extLst>
               <a:ext uri="{91240B29-F687-4f45-9708-019B960494DF}">
-                <a14:hiddenLine xmlns:a14="http://schemas.microsoft.com/office/drawing/2010/main" xmlns="" w="9525">
+                <a14:hiddenLine xmlns="" xmlns:a14="http://schemas.microsoft.com/office/drawing/2010/main" w="9525">
                   <a:solidFill>
                     <a:srgbClr val="000000"/>
                   </a:solidFill>
@@ -14709,7 +14790,7 @@
             </a:ln>
             <a:extLst>
               <a:ext uri="{91240B29-F687-4f45-9708-019B960494DF}">
-                <a14:hiddenLine xmlns:a14="http://schemas.microsoft.com/office/drawing/2010/main" xmlns="" w="9525">
+                <a14:hiddenLine xmlns="" xmlns:a14="http://schemas.microsoft.com/office/drawing/2010/main" w="9525">
                   <a:solidFill>
                     <a:srgbClr val="000000"/>
                   </a:solidFill>
@@ -14799,7 +14880,7 @@
             </a:ln>
             <a:extLst>
               <a:ext uri="{91240B29-F687-4f45-9708-019B960494DF}">
-                <a14:hiddenLine xmlns:a14="http://schemas.microsoft.com/office/drawing/2010/main" xmlns="" w="9525">
+                <a14:hiddenLine xmlns="" xmlns:a14="http://schemas.microsoft.com/office/drawing/2010/main" w="9525">
                   <a:solidFill>
                     <a:srgbClr val="000000"/>
                   </a:solidFill>
@@ -14867,7 +14948,7 @@
             </a:ln>
             <a:extLst>
               <a:ext uri="{91240B29-F687-4f45-9708-019B960494DF}">
-                <a14:hiddenLine xmlns:a14="http://schemas.microsoft.com/office/drawing/2010/main" xmlns="" w="9525">
+                <a14:hiddenLine xmlns="" xmlns:a14="http://schemas.microsoft.com/office/drawing/2010/main" w="9525">
                   <a:solidFill>
                     <a:srgbClr val="000000"/>
                   </a:solidFill>
@@ -14957,7 +15038,7 @@
             </a:ln>
             <a:extLst>
               <a:ext uri="{91240B29-F687-4f45-9708-019B960494DF}">
-                <a14:hiddenLine xmlns:a14="http://schemas.microsoft.com/office/drawing/2010/main" xmlns="" w="9525">
+                <a14:hiddenLine xmlns="" xmlns:a14="http://schemas.microsoft.com/office/drawing/2010/main" w="9525">
                   <a:solidFill>
                     <a:srgbClr val="000000"/>
                   </a:solidFill>
@@ -14991,7 +15072,7 @@
             </a:ln>
             <a:extLst>
               <a:ext uri="{91240B29-F687-4f45-9708-019B960494DF}">
-                <a14:hiddenLine xmlns:a14="http://schemas.microsoft.com/office/drawing/2010/main" xmlns="" w="9525">
+                <a14:hiddenLine xmlns="" xmlns:a14="http://schemas.microsoft.com/office/drawing/2010/main" w="9525">
                   <a:solidFill>
                     <a:srgbClr val="000000"/>
                   </a:solidFill>
@@ -15081,7 +15162,7 @@
             </a:ln>
             <a:extLst>
               <a:ext uri="{91240B29-F687-4f45-9708-019B960494DF}">
-                <a14:hiddenLine xmlns:a14="http://schemas.microsoft.com/office/drawing/2010/main" xmlns="" w="9525">
+                <a14:hiddenLine xmlns="" xmlns:a14="http://schemas.microsoft.com/office/drawing/2010/main" w="9525">
                   <a:solidFill>
                     <a:srgbClr val="000000"/>
                   </a:solidFill>
@@ -15143,7 +15224,7 @@
             </a:ln>
             <a:extLst>
               <a:ext uri="{91240B29-F687-4f45-9708-019B960494DF}">
-                <a14:hiddenLine xmlns:a14="http://schemas.microsoft.com/office/drawing/2010/main" xmlns="" w="9525">
+                <a14:hiddenLine xmlns="" xmlns:a14="http://schemas.microsoft.com/office/drawing/2010/main" w="9525">
                   <a:solidFill>
                     <a:srgbClr val="000000"/>
                   </a:solidFill>
@@ -15205,7 +15286,7 @@
             </a:ln>
             <a:extLst>
               <a:ext uri="{91240B29-F687-4f45-9708-019B960494DF}">
-                <a14:hiddenLine xmlns:a14="http://schemas.microsoft.com/office/drawing/2010/main" xmlns="" w="9525">
+                <a14:hiddenLine xmlns="" xmlns:a14="http://schemas.microsoft.com/office/drawing/2010/main" w="9525">
                   <a:solidFill>
                     <a:srgbClr val="000000"/>
                   </a:solidFill>
@@ -15295,7 +15376,7 @@
             </a:ln>
             <a:extLst>
               <a:ext uri="{91240B29-F687-4f45-9708-019B960494DF}">
-                <a14:hiddenLine xmlns:a14="http://schemas.microsoft.com/office/drawing/2010/main" xmlns="" w="9525">
+                <a14:hiddenLine xmlns="" xmlns:a14="http://schemas.microsoft.com/office/drawing/2010/main" w="9525">
                   <a:solidFill>
                     <a:srgbClr val="000000"/>
                   </a:solidFill>
@@ -15363,7 +15444,7 @@
             </a:ln>
             <a:extLst>
               <a:ext uri="{91240B29-F687-4f45-9708-019B960494DF}">
-                <a14:hiddenLine xmlns:a14="http://schemas.microsoft.com/office/drawing/2010/main" xmlns="" w="9525">
+                <a14:hiddenLine xmlns="" xmlns:a14="http://schemas.microsoft.com/office/drawing/2010/main" w="9525">
                   <a:solidFill>
                     <a:srgbClr val="000000"/>
                   </a:solidFill>
@@ -15425,7 +15506,7 @@
             </a:ln>
             <a:extLst>
               <a:ext uri="{91240B29-F687-4f45-9708-019B960494DF}">
-                <a14:hiddenLine xmlns:a14="http://schemas.microsoft.com/office/drawing/2010/main" xmlns="" w="9525">
+                <a14:hiddenLine xmlns="" xmlns:a14="http://schemas.microsoft.com/office/drawing/2010/main" w="9525">
                   <a:solidFill>
                     <a:srgbClr val="000000"/>
                   </a:solidFill>
@@ -15515,7 +15596,7 @@
             </a:ln>
             <a:extLst>
               <a:ext uri="{91240B29-F687-4f45-9708-019B960494DF}">
-                <a14:hiddenLine xmlns:a14="http://schemas.microsoft.com/office/drawing/2010/main" xmlns="" w="9525">
+                <a14:hiddenLine xmlns="" xmlns:a14="http://schemas.microsoft.com/office/drawing/2010/main" w="9525">
                   <a:solidFill>
                     <a:srgbClr val="000000"/>
                   </a:solidFill>
@@ -15577,7 +15658,7 @@
             </a:ln>
             <a:extLst>
               <a:ext uri="{91240B29-F687-4f45-9708-019B960494DF}">
-                <a14:hiddenLine xmlns:a14="http://schemas.microsoft.com/office/drawing/2010/main" xmlns="" w="9525">
+                <a14:hiddenLine xmlns="" xmlns:a14="http://schemas.microsoft.com/office/drawing/2010/main" w="9525">
                   <a:solidFill>
                     <a:srgbClr val="000000"/>
                   </a:solidFill>
@@ -15667,7 +15748,7 @@
             </a:ln>
             <a:extLst>
               <a:ext uri="{91240B29-F687-4f45-9708-019B960494DF}">
-                <a14:hiddenLine xmlns:a14="http://schemas.microsoft.com/office/drawing/2010/main" xmlns="" w="9525">
+                <a14:hiddenLine xmlns="" xmlns:a14="http://schemas.microsoft.com/office/drawing/2010/main" w="9525">
                   <a:solidFill>
                     <a:srgbClr val="000000"/>
                   </a:solidFill>
@@ -15729,7 +15810,7 @@
             </a:ln>
             <a:extLst>
               <a:ext uri="{91240B29-F687-4f45-9708-019B960494DF}">
-                <a14:hiddenLine xmlns:a14="http://schemas.microsoft.com/office/drawing/2010/main" xmlns="" w="9525">
+                <a14:hiddenLine xmlns="" xmlns:a14="http://schemas.microsoft.com/office/drawing/2010/main" w="9525">
                   <a:solidFill>
                     <a:srgbClr val="000000"/>
                   </a:solidFill>
@@ -15819,7 +15900,7 @@
             </a:ln>
             <a:extLst>
               <a:ext uri="{91240B29-F687-4f45-9708-019B960494DF}">
-                <a14:hiddenLine xmlns:a14="http://schemas.microsoft.com/office/drawing/2010/main" xmlns="" w="9525">
+                <a14:hiddenLine xmlns="" xmlns:a14="http://schemas.microsoft.com/office/drawing/2010/main" w="9525">
                   <a:solidFill>
                     <a:srgbClr val="000000"/>
                   </a:solidFill>
@@ -15853,7 +15934,7 @@
             </a:ln>
             <a:extLst>
               <a:ext uri="{91240B29-F687-4f45-9708-019B960494DF}">
-                <a14:hiddenLine xmlns:a14="http://schemas.microsoft.com/office/drawing/2010/main" xmlns="" w="9525">
+                <a14:hiddenLine xmlns="" xmlns:a14="http://schemas.microsoft.com/office/drawing/2010/main" w="9525">
                   <a:solidFill>
                     <a:srgbClr val="000000"/>
                   </a:solidFill>
@@ -15918,7 +15999,7 @@
             </a:ln>
             <a:extLst>
               <a:ext uri="{91240B29-F687-4f45-9708-019B960494DF}">
-                <a14:hiddenLine xmlns:a14="http://schemas.microsoft.com/office/drawing/2010/main" xmlns="" w="9525">
+                <a14:hiddenLine xmlns="" xmlns:a14="http://schemas.microsoft.com/office/drawing/2010/main" w="9525">
                   <a:solidFill>
                     <a:srgbClr val="000000"/>
                   </a:solidFill>
@@ -16008,7 +16089,7 @@
             </a:ln>
             <a:extLst>
               <a:ext uri="{91240B29-F687-4f45-9708-019B960494DF}">
-                <a14:hiddenLine xmlns:a14="http://schemas.microsoft.com/office/drawing/2010/main" xmlns="" w="9525">
+                <a14:hiddenLine xmlns="" xmlns:a14="http://schemas.microsoft.com/office/drawing/2010/main" w="9525">
                   <a:solidFill>
                     <a:srgbClr val="000000"/>
                   </a:solidFill>
@@ -16070,7 +16151,7 @@
             </a:ln>
             <a:extLst>
               <a:ext uri="{91240B29-F687-4f45-9708-019B960494DF}">
-                <a14:hiddenLine xmlns:a14="http://schemas.microsoft.com/office/drawing/2010/main" xmlns="" w="9525">
+                <a14:hiddenLine xmlns="" xmlns:a14="http://schemas.microsoft.com/office/drawing/2010/main" w="9525">
                   <a:solidFill>
                     <a:srgbClr val="000000"/>
                   </a:solidFill>
@@ -16160,7 +16241,7 @@
             </a:ln>
             <a:extLst>
               <a:ext uri="{91240B29-F687-4f45-9708-019B960494DF}">
-                <a14:hiddenLine xmlns:a14="http://schemas.microsoft.com/office/drawing/2010/main" xmlns="" w="9525">
+                <a14:hiddenLine xmlns="" xmlns:a14="http://schemas.microsoft.com/office/drawing/2010/main" w="9525">
                   <a:solidFill>
                     <a:srgbClr val="000000"/>
                   </a:solidFill>
@@ -16250,7 +16331,7 @@
             </a:ln>
             <a:extLst>
               <a:ext uri="{91240B29-F687-4f45-9708-019B960494DF}">
-                <a14:hiddenLine xmlns:a14="http://schemas.microsoft.com/office/drawing/2010/main" xmlns="" w="9525">
+                <a14:hiddenLine xmlns="" xmlns:a14="http://schemas.microsoft.com/office/drawing/2010/main" w="9525">
                   <a:solidFill>
                     <a:srgbClr val="000000"/>
                   </a:solidFill>
@@ -16315,7 +16396,7 @@
             </a:ln>
             <a:extLst>
               <a:ext uri="{91240B29-F687-4f45-9708-019B960494DF}">
-                <a14:hiddenLine xmlns:a14="http://schemas.microsoft.com/office/drawing/2010/main" xmlns="" w="9525">
+                <a14:hiddenLine xmlns="" xmlns:a14="http://schemas.microsoft.com/office/drawing/2010/main" w="9525">
                   <a:solidFill>
                     <a:srgbClr val="000000"/>
                   </a:solidFill>
@@ -16377,7 +16458,7 @@
             </a:ln>
             <a:extLst>
               <a:ext uri="{91240B29-F687-4f45-9708-019B960494DF}">
-                <a14:hiddenLine xmlns:a14="http://schemas.microsoft.com/office/drawing/2010/main" xmlns="" w="9525">
+                <a14:hiddenLine xmlns="" xmlns:a14="http://schemas.microsoft.com/office/drawing/2010/main" w="9525">
                   <a:solidFill>
                     <a:srgbClr val="000000"/>
                   </a:solidFill>
@@ -16467,7 +16548,7 @@
             </a:ln>
             <a:extLst>
               <a:ext uri="{91240B29-F687-4f45-9708-019B960494DF}">
-                <a14:hiddenLine xmlns:a14="http://schemas.microsoft.com/office/drawing/2010/main" xmlns="" w="9525">
+                <a14:hiddenLine xmlns="" xmlns:a14="http://schemas.microsoft.com/office/drawing/2010/main" w="9525">
                   <a:solidFill>
                     <a:srgbClr val="000000"/>
                   </a:solidFill>
@@ -16557,7 +16638,7 @@
             </a:ln>
             <a:extLst>
               <a:ext uri="{91240B29-F687-4f45-9708-019B960494DF}">
-                <a14:hiddenLine xmlns:a14="http://schemas.microsoft.com/office/drawing/2010/main" xmlns="" w="9525">
+                <a14:hiddenLine xmlns="" xmlns:a14="http://schemas.microsoft.com/office/drawing/2010/main" w="9525">
                   <a:solidFill>
                     <a:srgbClr val="000000"/>
                   </a:solidFill>
@@ -16619,7 +16700,7 @@
             </a:ln>
             <a:extLst>
               <a:ext uri="{91240B29-F687-4f45-9708-019B960494DF}">
-                <a14:hiddenLine xmlns:a14="http://schemas.microsoft.com/office/drawing/2010/main" xmlns="" w="9525">
+                <a14:hiddenLine xmlns="" xmlns:a14="http://schemas.microsoft.com/office/drawing/2010/main" w="9525">
                   <a:solidFill>
                     <a:srgbClr val="000000"/>
                   </a:solidFill>
@@ -16739,7 +16820,7 @@
             </a:ln>
             <a:extLst>
               <a:ext uri="{91240B29-F687-4f45-9708-019B960494DF}">
-                <a14:hiddenLine xmlns:a14="http://schemas.microsoft.com/office/drawing/2010/main" xmlns="" w="9525">
+                <a14:hiddenLine xmlns="" xmlns:a14="http://schemas.microsoft.com/office/drawing/2010/main" w="9525">
                   <a:solidFill>
                     <a:srgbClr val="000000"/>
                   </a:solidFill>
@@ -16807,7 +16888,7 @@
             </a:ln>
             <a:extLst>
               <a:ext uri="{91240B29-F687-4f45-9708-019B960494DF}">
-                <a14:hiddenLine xmlns:a14="http://schemas.microsoft.com/office/drawing/2010/main" xmlns="" w="9525">
+                <a14:hiddenLine xmlns="" xmlns:a14="http://schemas.microsoft.com/office/drawing/2010/main" w="9525">
                   <a:solidFill>
                     <a:srgbClr val="000000"/>
                   </a:solidFill>
@@ -16897,7 +16978,7 @@
             </a:ln>
             <a:extLst>
               <a:ext uri="{91240B29-F687-4f45-9708-019B960494DF}">
-                <a14:hiddenLine xmlns:a14="http://schemas.microsoft.com/office/drawing/2010/main" xmlns="" w="9525">
+                <a14:hiddenLine xmlns="" xmlns:a14="http://schemas.microsoft.com/office/drawing/2010/main" w="9525">
                   <a:solidFill>
                     <a:srgbClr val="000000"/>
                   </a:solidFill>
@@ -21626,7 +21707,7 @@
           <a:noFill/>
           <a:extLst>
             <a:ext uri="{909E8E84-426E-40dd-AFC4-6F175D3DCCD1}">
-              <a14:hiddenFill xmlns:a14="http://schemas.microsoft.com/office/drawing/2010/main" xmlns="">
+              <a14:hiddenFill xmlns="" xmlns:a14="http://schemas.microsoft.com/office/drawing/2010/main">
                 <a:solidFill>
                   <a:srgbClr val="FFFFFF"/>
                 </a:solidFill>
@@ -21700,7 +21781,7 @@
               </a:ln>
               <a:extLst>
                 <a:ext uri="{91240B29-F687-4f45-9708-019B960494DF}">
-                  <a14:hiddenLine xmlns:a14="http://schemas.microsoft.com/office/drawing/2010/main" xmlns="" w="9525">
+                  <a14:hiddenLine xmlns="" xmlns:a14="http://schemas.microsoft.com/office/drawing/2010/main" w="9525">
                     <a:solidFill>
                       <a:srgbClr val="000000"/>
                     </a:solidFill>
@@ -21790,7 +21871,7 @@
               </a:ln>
               <a:extLst>
                 <a:ext uri="{91240B29-F687-4f45-9708-019B960494DF}">
-                  <a14:hiddenLine xmlns:a14="http://schemas.microsoft.com/office/drawing/2010/main" xmlns="" w="9525">
+                  <a14:hiddenLine xmlns="" xmlns:a14="http://schemas.microsoft.com/office/drawing/2010/main" w="9525">
                     <a:solidFill>
                       <a:srgbClr val="000000"/>
                     </a:solidFill>
@@ -21880,7 +21961,7 @@
               </a:ln>
               <a:extLst>
                 <a:ext uri="{91240B29-F687-4f45-9708-019B960494DF}">
-                  <a14:hiddenLine xmlns:a14="http://schemas.microsoft.com/office/drawing/2010/main" xmlns="" w="9525">
+                  <a14:hiddenLine xmlns="" xmlns:a14="http://schemas.microsoft.com/office/drawing/2010/main" w="9525">
                     <a:solidFill>
                       <a:srgbClr val="000000"/>
                     </a:solidFill>
@@ -21942,7 +22023,7 @@
               </a:ln>
               <a:extLst>
                 <a:ext uri="{91240B29-F687-4f45-9708-019B960494DF}">
-                  <a14:hiddenLine xmlns:a14="http://schemas.microsoft.com/office/drawing/2010/main" xmlns="" w="9525">
+                  <a14:hiddenLine xmlns="" xmlns:a14="http://schemas.microsoft.com/office/drawing/2010/main" w="9525">
                     <a:solidFill>
                       <a:srgbClr val="000000"/>
                     </a:solidFill>
@@ -22032,7 +22113,7 @@
               </a:ln>
               <a:extLst>
                 <a:ext uri="{91240B29-F687-4f45-9708-019B960494DF}">
-                  <a14:hiddenLine xmlns:a14="http://schemas.microsoft.com/office/drawing/2010/main" xmlns="" w="9525">
+                  <a14:hiddenLine xmlns="" xmlns:a14="http://schemas.microsoft.com/office/drawing/2010/main" w="9525">
                     <a:solidFill>
                       <a:srgbClr val="000000"/>
                     </a:solidFill>
@@ -22094,7 +22175,7 @@
               </a:ln>
               <a:extLst>
                 <a:ext uri="{91240B29-F687-4f45-9708-019B960494DF}">
-                  <a14:hiddenLine xmlns:a14="http://schemas.microsoft.com/office/drawing/2010/main" xmlns="" w="9525">
+                  <a14:hiddenLine xmlns="" xmlns:a14="http://schemas.microsoft.com/office/drawing/2010/main" w="9525">
                     <a:solidFill>
                       <a:srgbClr val="000000"/>
                     </a:solidFill>
@@ -22156,7 +22237,7 @@
               </a:ln>
               <a:extLst>
                 <a:ext uri="{91240B29-F687-4f45-9708-019B960494DF}">
-                  <a14:hiddenLine xmlns:a14="http://schemas.microsoft.com/office/drawing/2010/main" xmlns="" w="9525">
+                  <a14:hiddenLine xmlns="" xmlns:a14="http://schemas.microsoft.com/office/drawing/2010/main" w="9525">
                     <a:solidFill>
                       <a:srgbClr val="000000"/>
                     </a:solidFill>
@@ -22246,7 +22327,7 @@
               </a:ln>
               <a:extLst>
                 <a:ext uri="{91240B29-F687-4f45-9708-019B960494DF}">
-                  <a14:hiddenLine xmlns:a14="http://schemas.microsoft.com/office/drawing/2010/main" xmlns="" w="9525">
+                  <a14:hiddenLine xmlns="" xmlns:a14="http://schemas.microsoft.com/office/drawing/2010/main" w="9525">
                     <a:solidFill>
                       <a:srgbClr val="000000"/>
                     </a:solidFill>
@@ -22336,7 +22417,7 @@
               </a:ln>
               <a:extLst>
                 <a:ext uri="{91240B29-F687-4f45-9708-019B960494DF}">
-                  <a14:hiddenLine xmlns:a14="http://schemas.microsoft.com/office/drawing/2010/main" xmlns="" w="9525">
+                  <a14:hiddenLine xmlns="" xmlns:a14="http://schemas.microsoft.com/office/drawing/2010/main" w="9525">
                     <a:solidFill>
                       <a:srgbClr val="000000"/>
                     </a:solidFill>
@@ -22398,7 +22479,7 @@
               </a:ln>
               <a:extLst>
                 <a:ext uri="{91240B29-F687-4f45-9708-019B960494DF}">
-                  <a14:hiddenLine xmlns:a14="http://schemas.microsoft.com/office/drawing/2010/main" xmlns="" w="9525">
+                  <a14:hiddenLine xmlns="" xmlns:a14="http://schemas.microsoft.com/office/drawing/2010/main" w="9525">
                     <a:solidFill>
                       <a:srgbClr val="000000"/>
                     </a:solidFill>
@@ -22508,7 +22589,7 @@
               </a:ln>
               <a:extLst>
                 <a:ext uri="{91240B29-F687-4f45-9708-019B960494DF}">
-                  <a14:hiddenLine xmlns:a14="http://schemas.microsoft.com/office/drawing/2010/main" xmlns="" w="9525">
+                  <a14:hiddenLine xmlns="" xmlns:a14="http://schemas.microsoft.com/office/drawing/2010/main" w="9525">
                     <a:solidFill>
                       <a:srgbClr val="000000"/>
                     </a:solidFill>
@@ -22592,7 +22673,7 @@
               </a:ln>
               <a:extLst>
                 <a:ext uri="{91240B29-F687-4f45-9708-019B960494DF}">
-                  <a14:hiddenLine xmlns:a14="http://schemas.microsoft.com/office/drawing/2010/main" xmlns="" w="9525">
+                  <a14:hiddenLine xmlns="" xmlns:a14="http://schemas.microsoft.com/office/drawing/2010/main" w="9525">
                     <a:solidFill>
                       <a:srgbClr val="000000"/>
                     </a:solidFill>
@@ -22654,7 +22735,7 @@
               </a:ln>
               <a:extLst>
                 <a:ext uri="{91240B29-F687-4f45-9708-019B960494DF}">
-                  <a14:hiddenLine xmlns:a14="http://schemas.microsoft.com/office/drawing/2010/main" xmlns="" w="9525">
+                  <a14:hiddenLine xmlns="" xmlns:a14="http://schemas.microsoft.com/office/drawing/2010/main" w="9525">
                     <a:solidFill>
                       <a:srgbClr val="000000"/>
                     </a:solidFill>
@@ -22716,7 +22797,7 @@
               </a:ln>
               <a:extLst>
                 <a:ext uri="{91240B29-F687-4f45-9708-019B960494DF}">
-                  <a14:hiddenLine xmlns:a14="http://schemas.microsoft.com/office/drawing/2010/main" xmlns="" w="9525">
+                  <a14:hiddenLine xmlns="" xmlns:a14="http://schemas.microsoft.com/office/drawing/2010/main" w="9525">
                     <a:solidFill>
                       <a:srgbClr val="000000"/>
                     </a:solidFill>
@@ -22806,7 +22887,7 @@
               </a:ln>
               <a:extLst>
                 <a:ext uri="{91240B29-F687-4f45-9708-019B960494DF}">
-                  <a14:hiddenLine xmlns:a14="http://schemas.microsoft.com/office/drawing/2010/main" xmlns="" w="9525">
+                  <a14:hiddenLine xmlns="" xmlns:a14="http://schemas.microsoft.com/office/drawing/2010/main" w="9525">
                     <a:solidFill>
                       <a:srgbClr val="000000"/>
                     </a:solidFill>
@@ -22840,7 +22921,7 @@
               </a:ln>
               <a:extLst>
                 <a:ext uri="{91240B29-F687-4f45-9708-019B960494DF}">
-                  <a14:hiddenLine xmlns:a14="http://schemas.microsoft.com/office/drawing/2010/main" xmlns="" w="9525">
+                  <a14:hiddenLine xmlns="" xmlns:a14="http://schemas.microsoft.com/office/drawing/2010/main" w="9525">
                     <a:solidFill>
                       <a:srgbClr val="000000"/>
                     </a:solidFill>
@@ -22905,7 +22986,7 @@
               </a:ln>
               <a:extLst>
                 <a:ext uri="{91240B29-F687-4f45-9708-019B960494DF}">
-                  <a14:hiddenLine xmlns:a14="http://schemas.microsoft.com/office/drawing/2010/main" xmlns="" w="9525">
+                  <a14:hiddenLine xmlns="" xmlns:a14="http://schemas.microsoft.com/office/drawing/2010/main" w="9525">
                     <a:solidFill>
                       <a:srgbClr val="000000"/>
                     </a:solidFill>
@@ -22995,7 +23076,7 @@
               </a:ln>
               <a:extLst>
                 <a:ext uri="{91240B29-F687-4f45-9708-019B960494DF}">
-                  <a14:hiddenLine xmlns:a14="http://schemas.microsoft.com/office/drawing/2010/main" xmlns="" w="9525">
+                  <a14:hiddenLine xmlns="" xmlns:a14="http://schemas.microsoft.com/office/drawing/2010/main" w="9525">
                     <a:solidFill>
                       <a:srgbClr val="000000"/>
                     </a:solidFill>
@@ -23057,7 +23138,7 @@
               </a:ln>
               <a:extLst>
                 <a:ext uri="{91240B29-F687-4f45-9708-019B960494DF}">
-                  <a14:hiddenLine xmlns:a14="http://schemas.microsoft.com/office/drawing/2010/main" xmlns="" w="9525">
+                  <a14:hiddenLine xmlns="" xmlns:a14="http://schemas.microsoft.com/office/drawing/2010/main" w="9525">
                     <a:solidFill>
                       <a:srgbClr val="000000"/>
                     </a:solidFill>
@@ -23147,7 +23228,7 @@
               </a:ln>
               <a:extLst>
                 <a:ext uri="{91240B29-F687-4f45-9708-019B960494DF}">
-                  <a14:hiddenLine xmlns:a14="http://schemas.microsoft.com/office/drawing/2010/main" xmlns="" w="9525">
+                  <a14:hiddenLine xmlns="" xmlns:a14="http://schemas.microsoft.com/office/drawing/2010/main" w="9525">
                     <a:solidFill>
                       <a:srgbClr val="000000"/>
                     </a:solidFill>
@@ -23212,7 +23293,7 @@
               </a:ln>
               <a:extLst>
                 <a:ext uri="{91240B29-F687-4f45-9708-019B960494DF}">
-                  <a14:hiddenLine xmlns:a14="http://schemas.microsoft.com/office/drawing/2010/main" xmlns="" w="9525">
+                  <a14:hiddenLine xmlns="" xmlns:a14="http://schemas.microsoft.com/office/drawing/2010/main" w="9525">
                     <a:solidFill>
                       <a:srgbClr val="000000"/>
                     </a:solidFill>
@@ -23274,7 +23355,7 @@
               </a:ln>
               <a:extLst>
                 <a:ext uri="{91240B29-F687-4f45-9708-019B960494DF}">
-                  <a14:hiddenLine xmlns:a14="http://schemas.microsoft.com/office/drawing/2010/main" xmlns="" w="9525">
+                  <a14:hiddenLine xmlns="" xmlns:a14="http://schemas.microsoft.com/office/drawing/2010/main" w="9525">
                     <a:solidFill>
                       <a:srgbClr val="000000"/>
                     </a:solidFill>
@@ -23364,7 +23445,7 @@
               </a:ln>
               <a:extLst>
                 <a:ext uri="{91240B29-F687-4f45-9708-019B960494DF}">
-                  <a14:hiddenLine xmlns:a14="http://schemas.microsoft.com/office/drawing/2010/main" xmlns="" w="9525">
+                  <a14:hiddenLine xmlns="" xmlns:a14="http://schemas.microsoft.com/office/drawing/2010/main" w="9525">
                     <a:solidFill>
                       <a:srgbClr val="000000"/>
                     </a:solidFill>
@@ -23454,7 +23535,7 @@
               </a:ln>
               <a:extLst>
                 <a:ext uri="{91240B29-F687-4f45-9708-019B960494DF}">
-                  <a14:hiddenLine xmlns:a14="http://schemas.microsoft.com/office/drawing/2010/main" xmlns="" w="9525">
+                  <a14:hiddenLine xmlns="" xmlns:a14="http://schemas.microsoft.com/office/drawing/2010/main" w="9525">
                     <a:solidFill>
                       <a:srgbClr val="000000"/>
                     </a:solidFill>
@@ -23519,7 +23600,7 @@
               </a:ln>
               <a:extLst>
                 <a:ext uri="{91240B29-F687-4f45-9708-019B960494DF}">
-                  <a14:hiddenLine xmlns:a14="http://schemas.microsoft.com/office/drawing/2010/main" xmlns="" w="9525">
+                  <a14:hiddenLine xmlns="" xmlns:a14="http://schemas.microsoft.com/office/drawing/2010/main" w="9525">
                     <a:solidFill>
                       <a:srgbClr val="000000"/>
                     </a:solidFill>
@@ -23639,7 +23720,7 @@
               </a:ln>
               <a:extLst>
                 <a:ext uri="{91240B29-F687-4f45-9708-019B960494DF}">
-                  <a14:hiddenLine xmlns:a14="http://schemas.microsoft.com/office/drawing/2010/main" xmlns="" w="9525">
+                  <a14:hiddenLine xmlns="" xmlns:a14="http://schemas.microsoft.com/office/drawing/2010/main" w="9525">
                     <a:solidFill>
                       <a:srgbClr val="000000"/>
                     </a:solidFill>
@@ -23720,7 +23801,7 @@
               </a:ln>
               <a:extLst>
                 <a:ext uri="{91240B29-F687-4f45-9708-019B960494DF}">
-                  <a14:hiddenLine xmlns:a14="http://schemas.microsoft.com/office/drawing/2010/main" xmlns="" w="9525">
+                  <a14:hiddenLine xmlns="" xmlns:a14="http://schemas.microsoft.com/office/drawing/2010/main" w="9525">
                     <a:solidFill>
                       <a:srgbClr val="000000"/>
                     </a:solidFill>
@@ -23835,7 +23916,7 @@
               </a:ln>
               <a:extLst>
                 <a:ext uri="{91240B29-F687-4f45-9708-019B960494DF}">
-                  <a14:hiddenLine xmlns:a14="http://schemas.microsoft.com/office/drawing/2010/main" xmlns="" w="9525">
+                  <a14:hiddenLine xmlns="" xmlns:a14="http://schemas.microsoft.com/office/drawing/2010/main" w="9525">
                     <a:solidFill>
                       <a:srgbClr val="000000"/>
                     </a:solidFill>
@@ -23925,7 +24006,7 @@
               </a:ln>
               <a:extLst>
                 <a:ext uri="{91240B29-F687-4f45-9708-019B960494DF}">
-                  <a14:hiddenLine xmlns:a14="http://schemas.microsoft.com/office/drawing/2010/main" xmlns="" w="9525">
+                  <a14:hiddenLine xmlns="" xmlns:a14="http://schemas.microsoft.com/office/drawing/2010/main" w="9525">
                     <a:solidFill>
                       <a:srgbClr val="000000"/>
                     </a:solidFill>
@@ -23990,7 +24071,7 @@
               </a:ln>
               <a:extLst>
                 <a:ext uri="{91240B29-F687-4f45-9708-019B960494DF}">
-                  <a14:hiddenLine xmlns:a14="http://schemas.microsoft.com/office/drawing/2010/main" xmlns="" w="9525">
+                  <a14:hiddenLine xmlns="" xmlns:a14="http://schemas.microsoft.com/office/drawing/2010/main" w="9525">
                     <a:solidFill>
                       <a:srgbClr val="000000"/>
                     </a:solidFill>
@@ -24080,7 +24161,7 @@
               </a:ln>
               <a:extLst>
                 <a:ext uri="{91240B29-F687-4f45-9708-019B960494DF}">
-                  <a14:hiddenLine xmlns:a14="http://schemas.microsoft.com/office/drawing/2010/main" xmlns="" w="9525">
+                  <a14:hiddenLine xmlns="" xmlns:a14="http://schemas.microsoft.com/office/drawing/2010/main" w="9525">
                     <a:solidFill>
                       <a:srgbClr val="000000"/>
                     </a:solidFill>
@@ -24148,7 +24229,7 @@
               </a:ln>
               <a:extLst>
                 <a:ext uri="{91240B29-F687-4f45-9708-019B960494DF}">
-                  <a14:hiddenLine xmlns:a14="http://schemas.microsoft.com/office/drawing/2010/main" xmlns="" w="9525">
+                  <a14:hiddenLine xmlns="" xmlns:a14="http://schemas.microsoft.com/office/drawing/2010/main" w="9525">
                     <a:solidFill>
                       <a:srgbClr val="000000"/>
                     </a:solidFill>
@@ -24238,7 +24319,7 @@
               </a:ln>
               <a:extLst>
                 <a:ext uri="{91240B29-F687-4f45-9708-019B960494DF}">
-                  <a14:hiddenLine xmlns:a14="http://schemas.microsoft.com/office/drawing/2010/main" xmlns="" w="9525">
+                  <a14:hiddenLine xmlns="" xmlns:a14="http://schemas.microsoft.com/office/drawing/2010/main" w="9525">
                     <a:solidFill>
                       <a:srgbClr val="000000"/>
                     </a:solidFill>
@@ -24306,7 +24387,7 @@
               </a:ln>
               <a:extLst>
                 <a:ext uri="{91240B29-F687-4f45-9708-019B960494DF}">
-                  <a14:hiddenLine xmlns:a14="http://schemas.microsoft.com/office/drawing/2010/main" xmlns="" w="9525">
+                  <a14:hiddenLine xmlns="" xmlns:a14="http://schemas.microsoft.com/office/drawing/2010/main" w="9525">
                     <a:solidFill>
                       <a:srgbClr val="000000"/>
                     </a:solidFill>
@@ -24396,7 +24477,7 @@
               </a:ln>
               <a:extLst>
                 <a:ext uri="{91240B29-F687-4f45-9708-019B960494DF}">
-                  <a14:hiddenLine xmlns:a14="http://schemas.microsoft.com/office/drawing/2010/main" xmlns="" w="9525">
+                  <a14:hiddenLine xmlns="" xmlns:a14="http://schemas.microsoft.com/office/drawing/2010/main" w="9525">
                     <a:solidFill>
                       <a:srgbClr val="000000"/>
                     </a:solidFill>
@@ -24430,7 +24511,7 @@
               </a:ln>
               <a:extLst>
                 <a:ext uri="{91240B29-F687-4f45-9708-019B960494DF}">
-                  <a14:hiddenLine xmlns:a14="http://schemas.microsoft.com/office/drawing/2010/main" xmlns="" w="9525">
+                  <a14:hiddenLine xmlns="" xmlns:a14="http://schemas.microsoft.com/office/drawing/2010/main" w="9525">
                     <a:solidFill>
                       <a:srgbClr val="000000"/>
                     </a:solidFill>
@@ -25105,6 +25186,18 @@
   <p:clrMapOvr>
     <a:masterClrMapping/>
   </p:clrMapOvr>
+  <mc:AlternateContent xmlns:mc="http://schemas.openxmlformats.org/markup-compatibility/2006">
+    <mc:Choice xmlns:p14="http://schemas.microsoft.com/office/powerpoint/2010/main" Requires="p14">
+      <p:transition spd="slow" p14:dur="800">
+        <p14:flythrough/>
+      </p:transition>
+    </mc:Choice>
+    <mc:Fallback>
+      <p:transition spd="slow">
+        <p:fade/>
+      </p:transition>
+    </mc:Fallback>
+  </mc:AlternateContent>
   <p:timing>
     <p:tnLst>
       <p:par>
@@ -25116,6 +25209,120 @@
 </file>
 
 <file path=ppt/slides/slide10.xml><?xml version="1.0" encoding="utf-8"?>
+<p:sld xmlns:a="http://schemas.openxmlformats.org/drawingml/2006/main" xmlns:r="http://schemas.openxmlformats.org/officeDocument/2006/relationships" xmlns:p="http://schemas.openxmlformats.org/presentationml/2006/main">
+  <p:cSld>
+    <p:spTree>
+      <p:nvGrpSpPr>
+        <p:cNvPr id="1" name=""/>
+        <p:cNvGrpSpPr/>
+        <p:nvPr/>
+      </p:nvGrpSpPr>
+      <p:grpSpPr>
+        <a:xfrm>
+          <a:off x="0" y="0"/>
+          <a:ext cx="0" cy="0"/>
+          <a:chOff x="0" y="0"/>
+          <a:chExt cx="0" cy="0"/>
+        </a:xfrm>
+      </p:grpSpPr>
+      <p:sp>
+        <p:nvSpPr>
+          <p:cNvPr id="3" name="TextBox 2"/>
+          <p:cNvSpPr txBox="1"/>
+          <p:nvPr/>
+        </p:nvSpPr>
+        <p:spPr>
+          <a:xfrm>
+            <a:off x="3092613" y="2551837"/>
+            <a:ext cx="6006773" cy="1754326"/>
+          </a:xfrm>
+          <a:prstGeom prst="rect">
+            <a:avLst/>
+          </a:prstGeom>
+          <a:noFill/>
+        </p:spPr>
+        <p:txBody>
+          <a:bodyPr wrap="none" rtlCol="0">
+            <a:spAutoFit/>
+          </a:bodyPr>
+          <a:lstStyle/>
+          <a:p>
+            <a:r>
+              <a:rPr lang="en-US" sz="3600" u="sng" dirty="0" smtClean="0">
+                <a:latin typeface="HelveticaNeue LT 43 LightEx" panose="02000400000000000000" pitchFamily="2" charset="0"/>
+              </a:rPr>
+              <a:t>Smart </a:t>
+            </a:r>
+            <a:r>
+              <a:rPr lang="en-US" sz="3600" u="sng" dirty="0" err="1" smtClean="0">
+                <a:latin typeface="HelveticaNeue LT 43 LightEx" panose="02000400000000000000" pitchFamily="2" charset="0"/>
+              </a:rPr>
+              <a:t>Ebook</a:t>
+            </a:r>
+            <a:r>
+              <a:rPr lang="en-US" sz="3600" u="sng" dirty="0">
+                <a:latin typeface="HelveticaNeue LT 43 LightEx" panose="02000400000000000000" pitchFamily="2" charset="0"/>
+              </a:rPr>
+              <a:t> </a:t>
+            </a:r>
+            <a:r>
+              <a:rPr lang="en-US" sz="3600" u="sng" dirty="0" smtClean="0">
+                <a:latin typeface="HelveticaNeue LT 43 LightEx" panose="02000400000000000000" pitchFamily="2" charset="0"/>
+              </a:rPr>
+              <a:t>Generator?</a:t>
+            </a:r>
+          </a:p>
+          <a:p>
+            <a:endParaRPr lang="en-US" sz="3600" dirty="0">
+              <a:latin typeface="HelveticaNeue LT 43 LightEx" panose="02000400000000000000" pitchFamily="2" charset="0"/>
+            </a:endParaRPr>
+          </a:p>
+          <a:p>
+            <a:r>
+              <a:rPr lang="en-US" sz="3600" dirty="0" smtClean="0">
+                <a:latin typeface="HelveticaNeue LT 43 LightEx" panose="02000400000000000000" pitchFamily="2" charset="0"/>
+              </a:rPr>
+              <a:t>Not very smart right now</a:t>
+            </a:r>
+            <a:endParaRPr lang="en-US" sz="3600" dirty="0">
+              <a:latin typeface="HelveticaNeue LT 43 LightEx" panose="02000400000000000000" pitchFamily="2" charset="0"/>
+            </a:endParaRPr>
+          </a:p>
+        </p:txBody>
+      </p:sp>
+    </p:spTree>
+    <p:extLst>
+      <p:ext uri="{BB962C8B-B14F-4D97-AF65-F5344CB8AC3E}">
+        <p14:creationId xmlns:p14="http://schemas.microsoft.com/office/powerpoint/2010/main" val="4026981805"/>
+      </p:ext>
+    </p:extLst>
+  </p:cSld>
+  <p:clrMapOvr>
+    <a:masterClrMapping/>
+  </p:clrMapOvr>
+  <mc:AlternateContent xmlns:mc="http://schemas.openxmlformats.org/markup-compatibility/2006">
+    <mc:Choice xmlns:p14="http://schemas.microsoft.com/office/powerpoint/2010/main" Requires="p14">
+      <p:transition spd="slow" p14:dur="1600">
+        <p14:prism isContent="1" isInverted="1"/>
+      </p:transition>
+    </mc:Choice>
+    <mc:Fallback>
+      <p:transition spd="slow">
+        <p:fade/>
+      </p:transition>
+    </mc:Fallback>
+  </mc:AlternateContent>
+  <p:timing>
+    <p:tnLst>
+      <p:par>
+        <p:cTn id="1" dur="indefinite" restart="never" nodeType="tmRoot"/>
+      </p:par>
+    </p:tnLst>
+  </p:timing>
+</p:sld>
+</file>
+
+<file path=ppt/slides/slide11.xml><?xml version="1.0" encoding="utf-8"?>
 <p:sld xmlns:a="http://schemas.openxmlformats.org/drawingml/2006/main" xmlns:r="http://schemas.openxmlformats.org/officeDocument/2006/relationships" xmlns:p="http://schemas.openxmlformats.org/presentationml/2006/main">
   <p:cSld>
     <p:spTree>
@@ -25189,6 +25396,18 @@
   <p:clrMapOvr>
     <a:masterClrMapping/>
   </p:clrMapOvr>
+  <mc:AlternateContent xmlns:mc="http://schemas.openxmlformats.org/markup-compatibility/2006">
+    <mc:Choice xmlns:p14="http://schemas.microsoft.com/office/powerpoint/2010/main" Requires="p14">
+      <p:transition spd="slow" p14:dur="1600">
+        <p14:conveyor dir="l"/>
+      </p:transition>
+    </mc:Choice>
+    <mc:Fallback>
+      <p:transition spd="slow">
+        <p:fade/>
+      </p:transition>
+    </mc:Fallback>
+  </mc:AlternateContent>
   <p:timing>
     <p:tnLst>
       <p:par>
@@ -25199,7 +25418,7 @@
 </p:sld>
 </file>
 
-<file path=ppt/slides/slide11.xml><?xml version="1.0" encoding="utf-8"?>
+<file path=ppt/slides/slide12.xml><?xml version="1.0" encoding="utf-8"?>
 <p:sld xmlns:a="http://schemas.openxmlformats.org/drawingml/2006/main" xmlns:r="http://schemas.openxmlformats.org/officeDocument/2006/relationships" xmlns:p="http://schemas.openxmlformats.org/presentationml/2006/main">
   <p:cSld>
     <p:spTree>
@@ -25273,6 +25492,18 @@
   <p:clrMapOvr>
     <a:masterClrMapping/>
   </p:clrMapOvr>
+  <mc:AlternateContent xmlns:mc="http://schemas.openxmlformats.org/markup-compatibility/2006">
+    <mc:Choice xmlns:p14="http://schemas.microsoft.com/office/powerpoint/2010/main" Requires="p14">
+      <p:transition spd="slow" p14:dur="1600">
+        <p14:conveyor dir="l"/>
+      </p:transition>
+    </mc:Choice>
+    <mc:Fallback>
+      <p:transition spd="slow">
+        <p:fade/>
+      </p:transition>
+    </mc:Fallback>
+  </mc:AlternateContent>
   <p:timing>
     <p:tnLst>
       <p:par>
@@ -25283,7 +25514,7 @@
 </p:sld>
 </file>
 
-<file path=ppt/slides/slide12.xml><?xml version="1.0" encoding="utf-8"?>
+<file path=ppt/slides/slide13.xml><?xml version="1.0" encoding="utf-8"?>
 <p:sld xmlns:a="http://schemas.openxmlformats.org/drawingml/2006/main" xmlns:r="http://schemas.openxmlformats.org/officeDocument/2006/relationships" xmlns:p="http://schemas.openxmlformats.org/presentationml/2006/main">
   <p:cSld>
     <p:spTree>
@@ -25340,6 +25571,18 @@
   <p:clrMapOvr>
     <a:masterClrMapping/>
   </p:clrMapOvr>
+  <mc:AlternateContent xmlns:mc="http://schemas.openxmlformats.org/markup-compatibility/2006">
+    <mc:Choice xmlns:p14="http://schemas.microsoft.com/office/powerpoint/2010/main" Requires="p14">
+      <p:transition spd="slow" p14:dur="1300">
+        <p14:pan dir="u"/>
+      </p:transition>
+    </mc:Choice>
+    <mc:Fallback>
+      <p:transition spd="slow">
+        <p:fade/>
+      </p:transition>
+    </mc:Fallback>
+  </mc:AlternateContent>
   <p:timing>
     <p:tnLst>
       <p:par>
@@ -25350,7 +25593,7 @@
 </p:sld>
 </file>
 
-<file path=ppt/slides/slide13.xml><?xml version="1.0" encoding="utf-8"?>
+<file path=ppt/slides/slide14.xml><?xml version="1.0" encoding="utf-8"?>
 <p:sld xmlns:a="http://schemas.openxmlformats.org/drawingml/2006/main" xmlns:r="http://schemas.openxmlformats.org/officeDocument/2006/relationships" xmlns:p="http://schemas.openxmlformats.org/presentationml/2006/main">
   <p:cSld>
     <p:spTree>
@@ -25424,6 +25667,18 @@
   <p:clrMapOvr>
     <a:masterClrMapping/>
   </p:clrMapOvr>
+  <mc:AlternateContent xmlns:mc="http://schemas.openxmlformats.org/markup-compatibility/2006">
+    <mc:Choice xmlns:p14="http://schemas.microsoft.com/office/powerpoint/2010/main" Requires="p14">
+      <p:transition spd="slow" p14:dur="1600">
+        <p14:prism isContent="1" isInverted="1"/>
+      </p:transition>
+    </mc:Choice>
+    <mc:Fallback>
+      <p:transition spd="slow">
+        <p:fade/>
+      </p:transition>
+    </mc:Fallback>
+  </mc:AlternateContent>
   <p:timing>
     <p:tnLst>
       <p:par>
@@ -25434,7 +25689,7 @@
 </p:sld>
 </file>
 
-<file path=ppt/slides/slide14.xml><?xml version="1.0" encoding="utf-8"?>
+<file path=ppt/slides/slide15.xml><?xml version="1.0" encoding="utf-8"?>
 <p:sld xmlns:a="http://schemas.openxmlformats.org/drawingml/2006/main" xmlns:r="http://schemas.openxmlformats.org/officeDocument/2006/relationships" xmlns:p="http://schemas.openxmlformats.org/presentationml/2006/main">
   <p:cSld>
     <p:spTree>
@@ -25491,6 +25746,18 @@
   <p:clrMapOvr>
     <a:masterClrMapping/>
   </p:clrMapOvr>
+  <mc:AlternateContent xmlns:mc="http://schemas.openxmlformats.org/markup-compatibility/2006">
+    <mc:Choice xmlns:p14="http://schemas.microsoft.com/office/powerpoint/2010/main" Requires="p14">
+      <p:transition spd="slow" p14:dur="1500">
+        <p14:window dir="vert"/>
+      </p:transition>
+    </mc:Choice>
+    <mc:Fallback>
+      <p:transition spd="slow">
+        <p:fade/>
+      </p:transition>
+    </mc:Fallback>
+  </mc:AlternateContent>
   <p:timing>
     <p:tnLst>
       <p:par>
@@ -25501,7 +25768,7 @@
 </p:sld>
 </file>
 
-<file path=ppt/slides/slide15.xml><?xml version="1.0" encoding="utf-8"?>
+<file path=ppt/slides/slide16.xml><?xml version="1.0" encoding="utf-8"?>
 <p:sld xmlns:a="http://schemas.openxmlformats.org/drawingml/2006/main" xmlns:r="http://schemas.openxmlformats.org/officeDocument/2006/relationships" xmlns:p="http://schemas.openxmlformats.org/presentationml/2006/main">
   <p:cSld>
     <p:spTree>
@@ -25558,6 +25825,18 @@
   <p:clrMapOvr>
     <a:masterClrMapping/>
   </p:clrMapOvr>
+  <mc:AlternateContent xmlns:mc="http://schemas.openxmlformats.org/markup-compatibility/2006">
+    <mc:Choice xmlns:p14="http://schemas.microsoft.com/office/powerpoint/2010/main" Requires="p14">
+      <p:transition spd="slow" p14:dur="1600">
+        <p14:conveyor dir="l"/>
+      </p:transition>
+    </mc:Choice>
+    <mc:Fallback>
+      <p:transition spd="slow">
+        <p:fade/>
+      </p:transition>
+    </mc:Fallback>
+  </mc:AlternateContent>
   <p:timing>
     <p:tnLst>
       <p:par>
@@ -25568,7 +25847,7 @@
 </p:sld>
 </file>
 
-<file path=ppt/slides/slide16.xml><?xml version="1.0" encoding="utf-8"?>
+<file path=ppt/slides/slide17.xml><?xml version="1.0" encoding="utf-8"?>
 <p:sld xmlns:a="http://schemas.openxmlformats.org/drawingml/2006/main" xmlns:r="http://schemas.openxmlformats.org/officeDocument/2006/relationships" xmlns:p="http://schemas.openxmlformats.org/presentationml/2006/main">
   <p:cSld>
     <p:spTree>
@@ -25625,6 +25904,18 @@
   <p:clrMapOvr>
     <a:masterClrMapping/>
   </p:clrMapOvr>
+  <mc:AlternateContent xmlns:mc="http://schemas.openxmlformats.org/markup-compatibility/2006">
+    <mc:Choice xmlns:p14="http://schemas.microsoft.com/office/powerpoint/2010/main" Requires="p14">
+      <p:transition spd="slow" p14:dur="1600">
+        <p14:conveyor dir="l"/>
+      </p:transition>
+    </mc:Choice>
+    <mc:Fallback>
+      <p:transition spd="slow">
+        <p:fade/>
+      </p:transition>
+    </mc:Fallback>
+  </mc:AlternateContent>
   <p:timing>
     <p:tnLst>
       <p:par>
@@ -25635,7 +25926,7 @@
 </p:sld>
 </file>
 
-<file path=ppt/slides/slide17.xml><?xml version="1.0" encoding="utf-8"?>
+<file path=ppt/slides/slide18.xml><?xml version="1.0" encoding="utf-8"?>
 <p:sld xmlns:a="http://schemas.openxmlformats.org/drawingml/2006/main" xmlns:r="http://schemas.openxmlformats.org/officeDocument/2006/relationships" xmlns:p="http://schemas.openxmlformats.org/presentationml/2006/main">
   <p:cSld>
     <p:spTree>
@@ -25709,6 +26000,18 @@
   <p:clrMapOvr>
     <a:masterClrMapping/>
   </p:clrMapOvr>
+  <mc:AlternateContent xmlns:mc="http://schemas.openxmlformats.org/markup-compatibility/2006">
+    <mc:Choice xmlns:p14="http://schemas.microsoft.com/office/powerpoint/2010/main" Requires="p14">
+      <p:transition spd="slow" p14:dur="800">
+        <p14:flythrough/>
+      </p:transition>
+    </mc:Choice>
+    <mc:Fallback>
+      <p:transition spd="slow">
+        <p:fade/>
+      </p:transition>
+    </mc:Fallback>
+  </mc:AlternateContent>
   <p:timing>
     <p:tnLst>
       <p:par>
@@ -25719,7 +26022,7 @@
 </p:sld>
 </file>
 
-<file path=ppt/slides/slide18.xml><?xml version="1.0" encoding="utf-8"?>
+<file path=ppt/slides/slide19.xml><?xml version="1.0" encoding="utf-8"?>
 <p:sld xmlns:a="http://schemas.openxmlformats.org/drawingml/2006/main" xmlns:r="http://schemas.openxmlformats.org/officeDocument/2006/relationships" xmlns:p="http://schemas.openxmlformats.org/presentationml/2006/main">
   <p:cSld>
     <p:spTree>
@@ -25823,65 +26126,18 @@
   <p:clrMapOvr>
     <a:masterClrMapping/>
   </p:clrMapOvr>
-  <p:timing>
-    <p:tnLst>
-      <p:par>
-        <p:cTn id="1" dur="indefinite" restart="never" nodeType="tmRoot"/>
-      </p:par>
-    </p:tnLst>
-  </p:timing>
-</p:sld>
-</file>
-
-<file path=ppt/slides/slide19.xml><?xml version="1.0" encoding="utf-8"?>
-<p:sld xmlns:a="http://schemas.openxmlformats.org/drawingml/2006/main" xmlns:r="http://schemas.openxmlformats.org/officeDocument/2006/relationships" xmlns:p="http://schemas.openxmlformats.org/presentationml/2006/main">
-  <p:cSld>
-    <p:spTree>
-      <p:nvGrpSpPr>
-        <p:cNvPr id="1" name=""/>
-        <p:cNvGrpSpPr/>
-        <p:nvPr/>
-      </p:nvGrpSpPr>
-      <p:grpSpPr>
-        <a:xfrm>
-          <a:off x="0" y="0"/>
-          <a:ext cx="0" cy="0"/>
-          <a:chOff x="0" y="0"/>
-          <a:chExt cx="0" cy="0"/>
-        </a:xfrm>
-      </p:grpSpPr>
-      <p:graphicFrame>
-        <p:nvGraphicFramePr>
-          <p:cNvPr id="2" name="Diagram 1"/>
-          <p:cNvGraphicFramePr/>
-          <p:nvPr>
-            <p:extLst>
-              <p:ext uri="{D42A27DB-BD31-4B8C-83A1-F6EECF244321}">
-                <p14:modId xmlns:p14="http://schemas.microsoft.com/office/powerpoint/2010/main" val="759347885"/>
-              </p:ext>
-            </p:extLst>
-          </p:nvPr>
-        </p:nvGraphicFramePr>
-        <p:xfrm>
-          <a:off x="2032000" y="719666"/>
-          <a:ext cx="8128000" cy="5418667"/>
-        </p:xfrm>
-        <a:graphic>
-          <a:graphicData uri="http://schemas.openxmlformats.org/drawingml/2006/diagram">
-            <dgm:relIds xmlns:dgm="http://schemas.openxmlformats.org/drawingml/2006/diagram" xmlns:r="http://schemas.openxmlformats.org/officeDocument/2006/relationships" r:dm="rId2" r:lo="rId3" r:qs="rId4" r:cs="rId5"/>
-          </a:graphicData>
-        </a:graphic>
-      </p:graphicFrame>
-    </p:spTree>
-    <p:extLst>
-      <p:ext uri="{BB962C8B-B14F-4D97-AF65-F5344CB8AC3E}">
-        <p14:creationId xmlns:p14="http://schemas.microsoft.com/office/powerpoint/2010/main" val="510837391"/>
-      </p:ext>
-    </p:extLst>
-  </p:cSld>
-  <p:clrMapOvr>
-    <a:masterClrMapping/>
-  </p:clrMapOvr>
+  <mc:AlternateContent xmlns:mc="http://schemas.openxmlformats.org/markup-compatibility/2006">
+    <mc:Choice xmlns:p14="http://schemas.microsoft.com/office/powerpoint/2010/main" Requires="p14">
+      <p:transition spd="slow" p14:dur="1600">
+        <p14:prism isContent="1" isInverted="1"/>
+      </p:transition>
+    </mc:Choice>
+    <mc:Fallback>
+      <p:transition spd="slow">
+        <p:fade/>
+      </p:transition>
+    </mc:Fallback>
+  </mc:AlternateContent>
   <p:timing>
     <p:tnLst>
       <p:par>
@@ -25961,6 +26217,18 @@
   <p:clrMapOvr>
     <a:masterClrMapping/>
   </p:clrMapOvr>
+  <mc:AlternateContent xmlns:mc="http://schemas.openxmlformats.org/markup-compatibility/2006">
+    <mc:Choice xmlns:p14="http://schemas.microsoft.com/office/powerpoint/2010/main" Requires="p14">
+      <p:transition spd="slow" p14:dur="1300">
+        <p14:pan dir="u"/>
+      </p:transition>
+    </mc:Choice>
+    <mc:Fallback>
+      <p:transition spd="slow">
+        <p:fade/>
+      </p:transition>
+    </mc:Fallback>
+  </mc:AlternateContent>
   <p:timing>
     <p:tnLst>
       <p:par>
@@ -25972,6 +26240,77 @@
 </file>
 
 <file path=ppt/slides/slide20.xml><?xml version="1.0" encoding="utf-8"?>
+<p:sld xmlns:a="http://schemas.openxmlformats.org/drawingml/2006/main" xmlns:r="http://schemas.openxmlformats.org/officeDocument/2006/relationships" xmlns:p="http://schemas.openxmlformats.org/presentationml/2006/main">
+  <p:cSld>
+    <p:spTree>
+      <p:nvGrpSpPr>
+        <p:cNvPr id="1" name=""/>
+        <p:cNvGrpSpPr/>
+        <p:nvPr/>
+      </p:nvGrpSpPr>
+      <p:grpSpPr>
+        <a:xfrm>
+          <a:off x="0" y="0"/>
+          <a:ext cx="0" cy="0"/>
+          <a:chOff x="0" y="0"/>
+          <a:chExt cx="0" cy="0"/>
+        </a:xfrm>
+      </p:grpSpPr>
+      <p:graphicFrame>
+        <p:nvGraphicFramePr>
+          <p:cNvPr id="2" name="Diagram 1"/>
+          <p:cNvGraphicFramePr/>
+          <p:nvPr>
+            <p:extLst>
+              <p:ext uri="{D42A27DB-BD31-4B8C-83A1-F6EECF244321}">
+                <p14:modId xmlns:p14="http://schemas.microsoft.com/office/powerpoint/2010/main" val="759347885"/>
+              </p:ext>
+            </p:extLst>
+          </p:nvPr>
+        </p:nvGraphicFramePr>
+        <p:xfrm>
+          <a:off x="2032000" y="719666"/>
+          <a:ext cx="8128000" cy="5418667"/>
+        </p:xfrm>
+        <a:graphic>
+          <a:graphicData uri="http://schemas.openxmlformats.org/drawingml/2006/diagram">
+            <dgm:relIds xmlns:dgm="http://schemas.openxmlformats.org/drawingml/2006/diagram" xmlns:r="http://schemas.openxmlformats.org/officeDocument/2006/relationships" r:dm="rId2" r:lo="rId3" r:qs="rId4" r:cs="rId5"/>
+          </a:graphicData>
+        </a:graphic>
+      </p:graphicFrame>
+    </p:spTree>
+    <p:extLst>
+      <p:ext uri="{BB962C8B-B14F-4D97-AF65-F5344CB8AC3E}">
+        <p14:creationId xmlns:p14="http://schemas.microsoft.com/office/powerpoint/2010/main" val="510837391"/>
+      </p:ext>
+    </p:extLst>
+  </p:cSld>
+  <p:clrMapOvr>
+    <a:masterClrMapping/>
+  </p:clrMapOvr>
+  <mc:AlternateContent xmlns:mc="http://schemas.openxmlformats.org/markup-compatibility/2006">
+    <mc:Choice xmlns:p14="http://schemas.microsoft.com/office/powerpoint/2010/main" Requires="p14">
+      <p:transition spd="slow" p14:dur="1300">
+        <p14:pan dir="u"/>
+      </p:transition>
+    </mc:Choice>
+    <mc:Fallback>
+      <p:transition spd="slow">
+        <p:fade/>
+      </p:transition>
+    </mc:Fallback>
+  </mc:AlternateContent>
+  <p:timing>
+    <p:tnLst>
+      <p:par>
+        <p:cTn id="1" dur="indefinite" restart="never" nodeType="tmRoot"/>
+      </p:par>
+    </p:tnLst>
+  </p:timing>
+</p:sld>
+</file>
+
+<file path=ppt/slides/slide21.xml><?xml version="1.0" encoding="utf-8"?>
 <p:sld xmlns:a="http://schemas.openxmlformats.org/drawingml/2006/main" xmlns:r="http://schemas.openxmlformats.org/officeDocument/2006/relationships" xmlns:p="http://schemas.openxmlformats.org/presentationml/2006/main">
   <p:cSld>
     <p:spTree>
@@ -26074,6 +26413,18 @@
   <p:clrMapOvr>
     <a:masterClrMapping/>
   </p:clrMapOvr>
+  <mc:AlternateContent xmlns:mc="http://schemas.openxmlformats.org/markup-compatibility/2006">
+    <mc:Choice xmlns:p14="http://schemas.microsoft.com/office/powerpoint/2010/main" Requires="p14">
+      <p:transition spd="slow" p14:dur="1300">
+        <p14:pan dir="u"/>
+      </p:transition>
+    </mc:Choice>
+    <mc:Fallback>
+      <p:transition spd="slow">
+        <p:fade/>
+      </p:transition>
+    </mc:Fallback>
+  </mc:AlternateContent>
   <p:timing>
     <p:tnLst>
       <p:par>
@@ -26084,7 +26435,7 @@
 </p:sld>
 </file>
 
-<file path=ppt/slides/slide21.xml><?xml version="1.0" encoding="utf-8"?>
+<file path=ppt/slides/slide22.xml><?xml version="1.0" encoding="utf-8"?>
 <p:sld xmlns:a="http://schemas.openxmlformats.org/drawingml/2006/main" xmlns:r="http://schemas.openxmlformats.org/officeDocument/2006/relationships" xmlns:p="http://schemas.openxmlformats.org/presentationml/2006/main">
   <p:cSld>
     <p:spTree>
@@ -26158,6 +26509,18 @@
   <p:clrMapOvr>
     <a:masterClrMapping/>
   </p:clrMapOvr>
+  <mc:AlternateContent xmlns:mc="http://schemas.openxmlformats.org/markup-compatibility/2006">
+    <mc:Choice xmlns:p14="http://schemas.microsoft.com/office/powerpoint/2010/main" Requires="p14">
+      <p:transition spd="slow" p14:dur="1600">
+        <p14:prism isContent="1" isInverted="1"/>
+      </p:transition>
+    </mc:Choice>
+    <mc:Fallback>
+      <p:transition spd="slow">
+        <p:fade/>
+      </p:transition>
+    </mc:Fallback>
+  </mc:AlternateContent>
   <p:timing>
     <p:tnLst>
       <p:par>
@@ -26168,7 +26531,7 @@
 </p:sld>
 </file>
 
-<file path=ppt/slides/slide22.xml><?xml version="1.0" encoding="utf-8"?>
+<file path=ppt/slides/slide23.xml><?xml version="1.0" encoding="utf-8"?>
 <p:sld xmlns:a="http://schemas.openxmlformats.org/drawingml/2006/main" xmlns:r="http://schemas.openxmlformats.org/officeDocument/2006/relationships" xmlns:p="http://schemas.openxmlformats.org/presentationml/2006/main">
   <p:cSld>
     <p:spTree>
@@ -26217,6 +26580,18 @@
   <p:clrMapOvr>
     <a:masterClrMapping/>
   </p:clrMapOvr>
+  <mc:AlternateContent xmlns:mc="http://schemas.openxmlformats.org/markup-compatibility/2006">
+    <mc:Choice xmlns:p14="http://schemas.microsoft.com/office/powerpoint/2010/main" Requires="p14">
+      <p:transition spd="slow" p14:dur="1300">
+        <p14:pan dir="u"/>
+      </p:transition>
+    </mc:Choice>
+    <mc:Fallback>
+      <p:transition spd="slow">
+        <p:fade/>
+      </p:transition>
+    </mc:Fallback>
+  </mc:AlternateContent>
   <p:timing>
     <p:tnLst>
       <p:par>
@@ -26227,7 +26602,7 @@
 </p:sld>
 </file>
 
-<file path=ppt/slides/slide23.xml><?xml version="1.0" encoding="utf-8"?>
+<file path=ppt/slides/slide24.xml><?xml version="1.0" encoding="utf-8"?>
 <p:sld xmlns:a="http://schemas.openxmlformats.org/drawingml/2006/main" xmlns:r="http://schemas.openxmlformats.org/officeDocument/2006/relationships" xmlns:p="http://schemas.openxmlformats.org/presentationml/2006/main">
   <p:cSld>
     <p:spTree>
@@ -26309,6 +26684,18 @@
   <p:clrMapOvr>
     <a:masterClrMapping/>
   </p:clrMapOvr>
+  <mc:AlternateContent xmlns:mc="http://schemas.openxmlformats.org/markup-compatibility/2006">
+    <mc:Choice xmlns:p14="http://schemas.microsoft.com/office/powerpoint/2010/main" Requires="p14">
+      <p:transition spd="slow" p14:dur="1600">
+        <p14:prism isContent="1" isInverted="1"/>
+      </p:transition>
+    </mc:Choice>
+    <mc:Fallback>
+      <p:transition spd="slow">
+        <p:fade/>
+      </p:transition>
+    </mc:Fallback>
+  </mc:AlternateContent>
   <p:timing>
     <p:tnLst>
       <p:par>
@@ -26319,7 +26706,7 @@
 </p:sld>
 </file>
 
-<file path=ppt/slides/slide24.xml><?xml version="1.0" encoding="utf-8"?>
+<file path=ppt/slides/slide25.xml><?xml version="1.0" encoding="utf-8"?>
 <p:sld xmlns:a="http://schemas.openxmlformats.org/drawingml/2006/main" xmlns:r="http://schemas.openxmlformats.org/officeDocument/2006/relationships" xmlns:p="http://schemas.openxmlformats.org/presentationml/2006/main">
   <p:cSld>
     <p:spTree>
@@ -26393,6 +26780,18 @@
   <p:clrMapOvr>
     <a:masterClrMapping/>
   </p:clrMapOvr>
+  <mc:AlternateContent xmlns:mc="http://schemas.openxmlformats.org/markup-compatibility/2006">
+    <mc:Choice xmlns:p14="http://schemas.microsoft.com/office/powerpoint/2010/main" Requires="p14">
+      <p:transition spd="slow" p14:dur="1500">
+        <p14:window dir="vert"/>
+      </p:transition>
+    </mc:Choice>
+    <mc:Fallback>
+      <p:transition spd="slow">
+        <p:fade/>
+      </p:transition>
+    </mc:Fallback>
+  </mc:AlternateContent>
   <p:timing>
     <p:tnLst>
       <p:par>
@@ -26460,6 +26859,18 @@
   <p:clrMapOvr>
     <a:masterClrMapping/>
   </p:clrMapOvr>
+  <mc:AlternateContent xmlns:mc="http://schemas.openxmlformats.org/markup-compatibility/2006">
+    <mc:Choice xmlns:p14="http://schemas.microsoft.com/office/powerpoint/2010/main" Requires="p14">
+      <p:transition spd="slow" p14:dur="1500">
+        <p14:window dir="vert"/>
+      </p:transition>
+    </mc:Choice>
+    <mc:Fallback>
+      <p:transition spd="slow">
+        <p:fade/>
+      </p:transition>
+    </mc:Fallback>
+  </mc:AlternateContent>
   <p:timing>
     <p:tnLst>
       <p:par>
@@ -26569,6 +26980,18 @@
   <p:clrMapOvr>
     <a:masterClrMapping/>
   </p:clrMapOvr>
+  <mc:AlternateContent xmlns:mc="http://schemas.openxmlformats.org/markup-compatibility/2006">
+    <mc:Choice xmlns:p14="http://schemas.microsoft.com/office/powerpoint/2010/main" Requires="p14">
+      <p:transition spd="slow" p14:dur="1600">
+        <p14:prism isContent="1" isInverted="1"/>
+      </p:transition>
+    </mc:Choice>
+    <mc:Fallback>
+      <p:transition spd="slow">
+        <p:fade/>
+      </p:transition>
+    </mc:Fallback>
+  </mc:AlternateContent>
   <p:timing>
     <p:tnLst>
       <p:par>
@@ -26636,6 +27059,18 @@
   <p:clrMapOvr>
     <a:masterClrMapping/>
   </p:clrMapOvr>
+  <mc:AlternateContent xmlns:mc="http://schemas.openxmlformats.org/markup-compatibility/2006">
+    <mc:Choice xmlns:p14="http://schemas.microsoft.com/office/powerpoint/2010/main" Requires="p14">
+      <p:transition spd="slow" p14:dur="1500">
+        <p14:window dir="vert"/>
+      </p:transition>
+    </mc:Choice>
+    <mc:Fallback>
+      <p:transition spd="slow">
+        <p:fade/>
+      </p:transition>
+    </mc:Fallback>
+  </mc:AlternateContent>
   <p:timing>
     <p:tnLst>
       <p:par>
@@ -26761,6 +27196,18 @@
   <p:clrMapOvr>
     <a:masterClrMapping/>
   </p:clrMapOvr>
+  <mc:AlternateContent xmlns:mc="http://schemas.openxmlformats.org/markup-compatibility/2006">
+    <mc:Choice xmlns:p14="http://schemas.microsoft.com/office/powerpoint/2010/main" Requires="p14">
+      <p:transition spd="slow" p14:dur="1600">
+        <p14:prism isContent="1" isInverted="1"/>
+      </p:transition>
+    </mc:Choice>
+    <mc:Fallback>
+      <p:transition spd="slow">
+        <p:fade/>
+      </p:transition>
+    </mc:Fallback>
+  </mc:AlternateContent>
   <p:timing>
     <p:tnLst>
       <p:par>
@@ -27098,6 +27545,18 @@
   <p:clrMapOvr>
     <a:masterClrMapping/>
   </p:clrMapOvr>
+  <mc:AlternateContent xmlns:mc="http://schemas.openxmlformats.org/markup-compatibility/2006">
+    <mc:Choice xmlns:p14="http://schemas.microsoft.com/office/powerpoint/2010/main" Requires="p14">
+      <p:transition spd="slow" p14:dur="1300">
+        <p14:pan dir="u"/>
+      </p:transition>
+    </mc:Choice>
+    <mc:Fallback>
+      <p:transition spd="slow">
+        <p:fade/>
+      </p:transition>
+    </mc:Fallback>
+  </mc:AlternateContent>
   <p:timing>
     <p:tnLst>
       <p:par>
@@ -27109,6 +27568,89 @@
 </file>
 
 <file path=ppt/slides/slide8.xml><?xml version="1.0" encoding="utf-8"?>
+<p:sld xmlns:a="http://schemas.openxmlformats.org/drawingml/2006/main" xmlns:r="http://schemas.openxmlformats.org/officeDocument/2006/relationships" xmlns:p="http://schemas.openxmlformats.org/presentationml/2006/main">
+  <p:cSld>
+    <p:spTree>
+      <p:nvGrpSpPr>
+        <p:cNvPr id="1" name=""/>
+        <p:cNvGrpSpPr/>
+        <p:nvPr/>
+      </p:nvGrpSpPr>
+      <p:grpSpPr>
+        <a:xfrm>
+          <a:off x="0" y="0"/>
+          <a:ext cx="0" cy="0"/>
+          <a:chOff x="0" y="0"/>
+          <a:chExt cx="0" cy="0"/>
+        </a:xfrm>
+      </p:grpSpPr>
+      <p:sp>
+        <p:nvSpPr>
+          <p:cNvPr id="2" name="TextBox 1"/>
+          <p:cNvSpPr txBox="1"/>
+          <p:nvPr/>
+        </p:nvSpPr>
+        <p:spPr>
+          <a:xfrm>
+            <a:off x="1555334" y="3067734"/>
+            <a:ext cx="9081332" cy="646331"/>
+          </a:xfrm>
+          <a:prstGeom prst="rect">
+            <a:avLst/>
+          </a:prstGeom>
+          <a:noFill/>
+        </p:spPr>
+        <p:txBody>
+          <a:bodyPr wrap="none" rtlCol="0">
+            <a:spAutoFit/>
+          </a:bodyPr>
+          <a:lstStyle/>
+          <a:p>
+            <a:r>
+              <a:rPr lang="en-US" sz="3600" u="sng" dirty="0" smtClean="0">
+                <a:latin typeface="HelveticaNeue LT 43 LightEx" panose="02000400000000000000" pitchFamily="2" charset="0"/>
+              </a:rPr>
+              <a:t>But how do we generate annotations?</a:t>
+            </a:r>
+            <a:endParaRPr lang="en-US" sz="3600" dirty="0" smtClean="0">
+              <a:latin typeface="HelveticaNeue LT 43 LightEx" panose="02000400000000000000" pitchFamily="2" charset="0"/>
+            </a:endParaRPr>
+          </a:p>
+        </p:txBody>
+      </p:sp>
+    </p:spTree>
+    <p:extLst>
+      <p:ext uri="{BB962C8B-B14F-4D97-AF65-F5344CB8AC3E}">
+        <p14:creationId xmlns:p14="http://schemas.microsoft.com/office/powerpoint/2010/main" val="2485440476"/>
+      </p:ext>
+    </p:extLst>
+  </p:cSld>
+  <p:clrMapOvr>
+    <a:masterClrMapping/>
+  </p:clrMapOvr>
+  <mc:AlternateContent xmlns:mc="http://schemas.openxmlformats.org/markup-compatibility/2006">
+    <mc:Choice xmlns:p14="http://schemas.microsoft.com/office/powerpoint/2010/main" Requires="p14">
+      <p:transition spd="slow" p14:dur="1600">
+        <p14:prism isContent="1" isInverted="1"/>
+      </p:transition>
+    </mc:Choice>
+    <mc:Fallback>
+      <p:transition spd="slow">
+        <p:fade/>
+      </p:transition>
+    </mc:Fallback>
+  </mc:AlternateContent>
+  <p:timing>
+    <p:tnLst>
+      <p:par>
+        <p:cTn id="1" dur="indefinite" restart="never" nodeType="tmRoot"/>
+      </p:par>
+    </p:tnLst>
+  </p:timing>
+</p:sld>
+</file>
+
+<file path=ppt/slides/slide9.xml><?xml version="1.0" encoding="utf-8"?>
 <p:sld xmlns:a="http://schemas.openxmlformats.org/drawingml/2006/main" xmlns:r="http://schemas.openxmlformats.org/officeDocument/2006/relationships" xmlns:p="http://schemas.openxmlformats.org/presentationml/2006/main">
   <p:cSld>
     <p:spTree>
@@ -27191,108 +27733,18 @@
   <p:clrMapOvr>
     <a:masterClrMapping/>
   </p:clrMapOvr>
-  <p:timing>
-    <p:tnLst>
-      <p:par>
-        <p:cTn id="1" dur="indefinite" restart="never" nodeType="tmRoot"/>
-      </p:par>
-    </p:tnLst>
-  </p:timing>
-</p:sld>
-</file>
-
-<file path=ppt/slides/slide9.xml><?xml version="1.0" encoding="utf-8"?>
-<p:sld xmlns:a="http://schemas.openxmlformats.org/drawingml/2006/main" xmlns:r="http://schemas.openxmlformats.org/officeDocument/2006/relationships" xmlns:p="http://schemas.openxmlformats.org/presentationml/2006/main">
-  <p:cSld>
-    <p:spTree>
-      <p:nvGrpSpPr>
-        <p:cNvPr id="1" name=""/>
-        <p:cNvGrpSpPr/>
-        <p:nvPr/>
-      </p:nvGrpSpPr>
-      <p:grpSpPr>
-        <a:xfrm>
-          <a:off x="0" y="0"/>
-          <a:ext cx="0" cy="0"/>
-          <a:chOff x="0" y="0"/>
-          <a:chExt cx="0" cy="0"/>
-        </a:xfrm>
-      </p:grpSpPr>
-      <p:sp>
-        <p:nvSpPr>
-          <p:cNvPr id="3" name="TextBox 2"/>
-          <p:cNvSpPr txBox="1"/>
-          <p:nvPr/>
-        </p:nvSpPr>
-        <p:spPr>
-          <a:xfrm>
-            <a:off x="3092613" y="2551837"/>
-            <a:ext cx="6006773" cy="1754326"/>
-          </a:xfrm>
-          <a:prstGeom prst="rect">
-            <a:avLst/>
-          </a:prstGeom>
-          <a:noFill/>
-        </p:spPr>
-        <p:txBody>
-          <a:bodyPr wrap="none" rtlCol="0">
-            <a:spAutoFit/>
-          </a:bodyPr>
-          <a:lstStyle/>
-          <a:p>
-            <a:r>
-              <a:rPr lang="en-US" sz="3600" u="sng" dirty="0" smtClean="0">
-                <a:latin typeface="HelveticaNeue LT 43 LightEx" panose="02000400000000000000" pitchFamily="2" charset="0"/>
-              </a:rPr>
-              <a:t>Smart </a:t>
-            </a:r>
-            <a:r>
-              <a:rPr lang="en-US" sz="3600" u="sng" dirty="0" err="1" smtClean="0">
-                <a:latin typeface="HelveticaNeue LT 43 LightEx" panose="02000400000000000000" pitchFamily="2" charset="0"/>
-              </a:rPr>
-              <a:t>Ebook</a:t>
-            </a:r>
-            <a:r>
-              <a:rPr lang="en-US" sz="3600" u="sng" dirty="0">
-                <a:latin typeface="HelveticaNeue LT 43 LightEx" panose="02000400000000000000" pitchFamily="2" charset="0"/>
-              </a:rPr>
-              <a:t> </a:t>
-            </a:r>
-            <a:r>
-              <a:rPr lang="en-US" sz="3600" u="sng" dirty="0" smtClean="0">
-                <a:latin typeface="HelveticaNeue LT 43 LightEx" panose="02000400000000000000" pitchFamily="2" charset="0"/>
-              </a:rPr>
-              <a:t>Generator?</a:t>
-            </a:r>
-          </a:p>
-          <a:p>
-            <a:endParaRPr lang="en-US" sz="3600" dirty="0">
-              <a:latin typeface="HelveticaNeue LT 43 LightEx" panose="02000400000000000000" pitchFamily="2" charset="0"/>
-            </a:endParaRPr>
-          </a:p>
-          <a:p>
-            <a:r>
-              <a:rPr lang="en-US" sz="3600" dirty="0" smtClean="0">
-                <a:latin typeface="HelveticaNeue LT 43 LightEx" panose="02000400000000000000" pitchFamily="2" charset="0"/>
-              </a:rPr>
-              <a:t>Not very smart right now</a:t>
-            </a:r>
-            <a:endParaRPr lang="en-US" sz="3600" dirty="0">
-              <a:latin typeface="HelveticaNeue LT 43 LightEx" panose="02000400000000000000" pitchFamily="2" charset="0"/>
-            </a:endParaRPr>
-          </a:p>
-        </p:txBody>
-      </p:sp>
-    </p:spTree>
-    <p:extLst>
-      <p:ext uri="{BB962C8B-B14F-4D97-AF65-F5344CB8AC3E}">
-        <p14:creationId xmlns:p14="http://schemas.microsoft.com/office/powerpoint/2010/main" val="4026981805"/>
-      </p:ext>
-    </p:extLst>
-  </p:cSld>
-  <p:clrMapOvr>
-    <a:masterClrMapping/>
-  </p:clrMapOvr>
+  <mc:AlternateContent xmlns:mc="http://schemas.openxmlformats.org/markup-compatibility/2006">
+    <mc:Choice xmlns:p14="http://schemas.microsoft.com/office/powerpoint/2010/main" Requires="p14">
+      <p:transition spd="slow" p14:dur="1300">
+        <p14:pan dir="u"/>
+      </p:transition>
+    </mc:Choice>
+    <mc:Fallback>
+      <p:transition spd="slow">
+        <p:fade/>
+      </p:transition>
+    </mc:Fallback>
+  </mc:AlternateContent>
   <p:timing>
     <p:tnLst>
       <p:par>

</xml_diff>